<commit_message>
Credited some tasks to the wrong person --fixed
</commit_message>
<xml_diff>
--- a/Presentation.pptx
+++ b/Presentation.pptx
@@ -3459,7 +3459,15 @@
             </a:r>
             <a:r>
               <a:rPr lang="nl-NL" dirty="0" smtClean="0"/>
-              <a:t>debugging McOS, hosted git, timer, refactoring galore, background raytracing</a:t>
+              <a:t>debugging McOS, hosted git, timer, refactoring galore, </a:t>
+            </a:r>
+            <a:r>
+              <a:rPr lang="nl-NL" smtClean="0"/>
+              <a:t>background raytracing, , current FPS counter, current RealTime RayTracing</a:t>
+            </a:r>
+            <a:r>
+              <a:rPr lang="nl-NL" dirty="0" smtClean="0"/>
+              <a:t/>
             </a:r>
             <a:br>
               <a:rPr lang="nl-NL" dirty="0" smtClean="0"/>
@@ -3470,13 +3478,12 @@
             </a:r>
             <a:r>
               <a:rPr lang="nl-NL" dirty="0" smtClean="0"/>
-              <a:t>ade beer bottle model, current </a:t>
+              <a:t>ade beer </a:t>
             </a:r>
             <a:r>
               <a:rPr lang="nl-NL" smtClean="0"/>
-              <a:t>FPS counter, current RealTime RayTracing</a:t>
-            </a:r>
-            <a:endParaRPr lang="nl-NL" dirty="0" smtClean="0"/>
+              <a:t>bottle model</a:t>
+            </a:r>
           </a:p>
           <a:p>
             <a:pPr marL="0" indent="0">

</xml_diff>

<commit_message>
Addded some screenies of a few previous iterations (not necessarily chronologically)
</commit_message>
<xml_diff>
--- a/Presentation.pptx
+++ b/Presentation.pptx
@@ -8,6 +8,11 @@
     <p:sldId id="256" r:id="rId2"/>
     <p:sldId id="257" r:id="rId3"/>
     <p:sldId id="258" r:id="rId4"/>
+    <p:sldId id="259" r:id="rId5"/>
+    <p:sldId id="261" r:id="rId6"/>
+    <p:sldId id="260" r:id="rId7"/>
+    <p:sldId id="262" r:id="rId8"/>
+    <p:sldId id="263" r:id="rId9"/>
   </p:sldIdLst>
   <p:sldSz cx="9144000" cy="6858000" type="screen4x3"/>
   <p:notesSz cx="6858000" cy="9144000"/>
@@ -3459,15 +3464,7 @@
             </a:r>
             <a:r>
               <a:rPr lang="nl-NL" dirty="0" smtClean="0"/>
-              <a:t>debugging McOS, hosted git, timer, refactoring galore, </a:t>
-            </a:r>
-            <a:r>
-              <a:rPr lang="nl-NL" smtClean="0"/>
-              <a:t>background raytracing, , current FPS counter, current RealTime RayTracing</a:t>
-            </a:r>
-            <a:r>
-              <a:rPr lang="nl-NL" dirty="0" smtClean="0"/>
-              <a:t/>
+              <a:t>debugging McOS, hosted git, timer, rewriting galore, background raytracing, , current FPS counter, current RealTime RayTracing</a:t>
             </a:r>
             <a:br>
               <a:rPr lang="nl-NL" dirty="0" smtClean="0"/>
@@ -3478,11 +3475,7 @@
             </a:r>
             <a:r>
               <a:rPr lang="nl-NL" dirty="0" smtClean="0"/>
-              <a:t>ade beer </a:t>
-            </a:r>
-            <a:r>
-              <a:rPr lang="nl-NL" smtClean="0"/>
-              <a:t>bottle model</a:t>
+              <a:t>ade beer bottle model</a:t>
             </a:r>
           </a:p>
           <a:p>
@@ -3520,6 +3513,492 @@
     <p:extLst>
       <p:ext uri="{BB962C8B-B14F-4D97-AF65-F5344CB8AC3E}">
         <p14:creationId xmlns:p14="http://schemas.microsoft.com/office/powerpoint/2010/main" val="219847222"/>
+      </p:ext>
+    </p:extLst>
+  </p:cSld>
+  <p:clrMapOvr>
+    <a:masterClrMapping/>
+  </p:clrMapOvr>
+</p:sld>
+</file>
+
+<file path=ppt/slides/slide4.xml><?xml version="1.0" encoding="utf-8"?>
+<p:sld xmlns:a="http://schemas.openxmlformats.org/drawingml/2006/main" xmlns:r="http://schemas.openxmlformats.org/officeDocument/2006/relationships" xmlns:p="http://schemas.openxmlformats.org/presentationml/2006/main">
+  <p:cSld>
+    <p:spTree>
+      <p:nvGrpSpPr>
+        <p:cNvPr id="1" name=""/>
+        <p:cNvGrpSpPr/>
+        <p:nvPr/>
+      </p:nvGrpSpPr>
+      <p:grpSpPr>
+        <a:xfrm>
+          <a:off x="0" y="0"/>
+          <a:ext cx="0" cy="0"/>
+          <a:chOff x="0" y="0"/>
+          <a:chExt cx="0" cy="0"/>
+        </a:xfrm>
+      </p:grpSpPr>
+      <p:sp>
+        <p:nvSpPr>
+          <p:cNvPr id="2" name="Title 1"/>
+          <p:cNvSpPr>
+            <a:spLocks noGrp="1"/>
+          </p:cNvSpPr>
+          <p:nvPr>
+            <p:ph type="title"/>
+          </p:nvPr>
+        </p:nvSpPr>
+        <p:spPr/>
+        <p:txBody>
+          <a:bodyPr/>
+          <a:lstStyle/>
+          <a:p>
+            <a:r>
+              <a:rPr lang="en-GB" dirty="0" smtClean="0"/>
+              <a:t>Psychedelic Art</a:t>
+            </a:r>
+            <a:endParaRPr lang="en-GB" dirty="0"/>
+          </a:p>
+        </p:txBody>
+      </p:sp>
+      <p:pic>
+        <p:nvPicPr>
+          <p:cNvPr id="4" name="Content Placeholder 3"/>
+          <p:cNvPicPr>
+            <a:picLocks noGrp="1" noChangeAspect="1"/>
+          </p:cNvPicPr>
+          <p:nvPr>
+            <p:ph idx="1"/>
+          </p:nvPr>
+        </p:nvPicPr>
+        <p:blipFill>
+          <a:blip r:embed="rId2">
+            <a:extLst>
+              <a:ext uri="{28A0092B-C50C-407E-A947-70E740481C1C}">
+                <a14:useLocalDpi xmlns:a14="http://schemas.microsoft.com/office/drawing/2010/main" val="0"/>
+              </a:ext>
+            </a:extLst>
+          </a:blip>
+          <a:stretch>
+            <a:fillRect/>
+          </a:stretch>
+        </p:blipFill>
+        <p:spPr>
+          <a:xfrm>
+            <a:off x="2299628" y="1600200"/>
+            <a:ext cx="4544743" cy="4525963"/>
+          </a:xfrm>
+        </p:spPr>
+      </p:pic>
+    </p:spTree>
+    <p:extLst>
+      <p:ext uri="{BB962C8B-B14F-4D97-AF65-F5344CB8AC3E}">
+        <p14:creationId xmlns:p14="http://schemas.microsoft.com/office/powerpoint/2010/main" val="579048949"/>
+      </p:ext>
+    </p:extLst>
+  </p:cSld>
+  <p:clrMapOvr>
+    <a:masterClrMapping/>
+  </p:clrMapOvr>
+</p:sld>
+</file>
+
+<file path=ppt/slides/slide5.xml><?xml version="1.0" encoding="utf-8"?>
+<p:sld xmlns:a="http://schemas.openxmlformats.org/drawingml/2006/main" xmlns:r="http://schemas.openxmlformats.org/officeDocument/2006/relationships" xmlns:p="http://schemas.openxmlformats.org/presentationml/2006/main">
+  <p:cSld>
+    <p:spTree>
+      <p:nvGrpSpPr>
+        <p:cNvPr id="1" name=""/>
+        <p:cNvGrpSpPr/>
+        <p:nvPr/>
+      </p:nvGrpSpPr>
+      <p:grpSpPr>
+        <a:xfrm>
+          <a:off x="0" y="0"/>
+          <a:ext cx="0" cy="0"/>
+          <a:chOff x="0" y="0"/>
+          <a:chExt cx="0" cy="0"/>
+        </a:xfrm>
+      </p:grpSpPr>
+      <p:sp>
+        <p:nvSpPr>
+          <p:cNvPr id="2" name="Title 1"/>
+          <p:cNvSpPr>
+            <a:spLocks noGrp="1"/>
+          </p:cNvSpPr>
+          <p:nvPr>
+            <p:ph type="title"/>
+          </p:nvPr>
+        </p:nvSpPr>
+        <p:spPr/>
+        <p:txBody>
+          <a:bodyPr/>
+          <a:lstStyle/>
+          <a:p>
+            <a:r>
+              <a:rPr lang="en-GB" dirty="0" smtClean="0"/>
+              <a:t>Our previous iterations</a:t>
+            </a:r>
+            <a:endParaRPr lang="en-GB" dirty="0"/>
+          </a:p>
+        </p:txBody>
+      </p:sp>
+      <p:sp>
+        <p:nvSpPr>
+          <p:cNvPr id="3" name="Content Placeholder 2"/>
+          <p:cNvSpPr>
+            <a:spLocks noGrp="1"/>
+          </p:cNvSpPr>
+          <p:nvPr>
+            <p:ph idx="1"/>
+          </p:nvPr>
+        </p:nvSpPr>
+        <p:spPr/>
+        <p:txBody>
+          <a:bodyPr/>
+          <a:lstStyle/>
+          <a:p>
+            <a:endParaRPr lang="en-GB"/>
+          </a:p>
+        </p:txBody>
+      </p:sp>
+      <p:pic>
+        <p:nvPicPr>
+          <p:cNvPr id="4" name="Picture 2"/>
+          <p:cNvPicPr>
+            <a:picLocks noChangeAspect="1" noChangeArrowheads="1"/>
+          </p:cNvPicPr>
+          <p:nvPr/>
+        </p:nvPicPr>
+        <p:blipFill>
+          <a:blip r:embed="rId2">
+            <a:extLst>
+              <a:ext uri="{28A0092B-C50C-407E-A947-70E740481C1C}">
+                <a14:useLocalDpi xmlns:a14="http://schemas.microsoft.com/office/drawing/2010/main" val="0"/>
+              </a:ext>
+            </a:extLst>
+          </a:blip>
+          <a:srcRect/>
+          <a:stretch>
+            <a:fillRect/>
+          </a:stretch>
+        </p:blipFill>
+        <p:spPr bwMode="auto">
+          <a:xfrm>
+            <a:off x="611560" y="1412776"/>
+            <a:ext cx="7620000" cy="4762500"/>
+          </a:xfrm>
+          <a:prstGeom prst="rect">
+            <a:avLst/>
+          </a:prstGeom>
+          <a:noFill/>
+          <a:ln>
+            <a:noFill/>
+          </a:ln>
+          <a:extLst>
+            <a:ext uri="{909E8E84-426E-40DD-AFC4-6F175D3DCCD1}">
+              <a14:hiddenFill xmlns:a14="http://schemas.microsoft.com/office/drawing/2010/main">
+                <a:solidFill>
+                  <a:schemeClr val="accent1"/>
+                </a:solidFill>
+              </a14:hiddenFill>
+            </a:ext>
+            <a:ext uri="{91240B29-F687-4F45-9708-019B960494DF}">
+              <a14:hiddenLine xmlns:a14="http://schemas.microsoft.com/office/drawing/2010/main" w="9525">
+                <a:solidFill>
+                  <a:schemeClr val="tx1"/>
+                </a:solidFill>
+                <a:miter lim="800000"/>
+                <a:headEnd/>
+                <a:tailEnd/>
+              </a14:hiddenLine>
+            </a:ext>
+          </a:extLst>
+        </p:spPr>
+      </p:pic>
+    </p:spTree>
+    <p:extLst>
+      <p:ext uri="{BB962C8B-B14F-4D97-AF65-F5344CB8AC3E}">
+        <p14:creationId xmlns:p14="http://schemas.microsoft.com/office/powerpoint/2010/main" val="925141404"/>
+      </p:ext>
+    </p:extLst>
+  </p:cSld>
+  <p:clrMapOvr>
+    <a:masterClrMapping/>
+  </p:clrMapOvr>
+</p:sld>
+</file>
+
+<file path=ppt/slides/slide6.xml><?xml version="1.0" encoding="utf-8"?>
+<p:sld xmlns:a="http://schemas.openxmlformats.org/drawingml/2006/main" xmlns:r="http://schemas.openxmlformats.org/officeDocument/2006/relationships" xmlns:p="http://schemas.openxmlformats.org/presentationml/2006/main">
+  <p:cSld>
+    <p:spTree>
+      <p:nvGrpSpPr>
+        <p:cNvPr id="1" name=""/>
+        <p:cNvGrpSpPr/>
+        <p:nvPr/>
+      </p:nvGrpSpPr>
+      <p:grpSpPr>
+        <a:xfrm>
+          <a:off x="0" y="0"/>
+          <a:ext cx="0" cy="0"/>
+          <a:chOff x="0" y="0"/>
+          <a:chExt cx="0" cy="0"/>
+        </a:xfrm>
+      </p:grpSpPr>
+      <p:sp>
+        <p:nvSpPr>
+          <p:cNvPr id="2" name="Title 1"/>
+          <p:cNvSpPr>
+            <a:spLocks noGrp="1"/>
+          </p:cNvSpPr>
+          <p:nvPr>
+            <p:ph type="title"/>
+          </p:nvPr>
+        </p:nvSpPr>
+        <p:spPr/>
+        <p:txBody>
+          <a:bodyPr/>
+          <a:lstStyle/>
+          <a:p>
+            <a:endParaRPr lang="en-GB" dirty="0"/>
+          </a:p>
+        </p:txBody>
+      </p:sp>
+      <p:sp>
+        <p:nvSpPr>
+          <p:cNvPr id="3" name="Content Placeholder 2"/>
+          <p:cNvSpPr>
+            <a:spLocks noGrp="1"/>
+          </p:cNvSpPr>
+          <p:nvPr>
+            <p:ph idx="1"/>
+          </p:nvPr>
+        </p:nvSpPr>
+        <p:spPr/>
+        <p:txBody>
+          <a:bodyPr/>
+          <a:lstStyle/>
+          <a:p>
+            <a:endParaRPr lang="en-GB" dirty="0"/>
+          </a:p>
+        </p:txBody>
+      </p:sp>
+      <p:pic>
+        <p:nvPicPr>
+          <p:cNvPr id="6" name="Picture 3"/>
+          <p:cNvPicPr>
+            <a:picLocks noChangeAspect="1" noChangeArrowheads="1"/>
+          </p:cNvPicPr>
+          <p:nvPr/>
+        </p:nvPicPr>
+        <p:blipFill>
+          <a:blip r:embed="rId2">
+            <a:extLst>
+              <a:ext uri="{28A0092B-C50C-407E-A947-70E740481C1C}">
+                <a14:useLocalDpi xmlns:a14="http://schemas.microsoft.com/office/drawing/2010/main" val="0"/>
+              </a:ext>
+            </a:extLst>
+          </a:blip>
+          <a:srcRect/>
+          <a:stretch>
+            <a:fillRect/>
+          </a:stretch>
+        </p:blipFill>
+        <p:spPr bwMode="auto">
+          <a:xfrm>
+            <a:off x="604200" y="1412776"/>
+            <a:ext cx="7620000" cy="4762500"/>
+          </a:xfrm>
+          <a:prstGeom prst="rect">
+            <a:avLst/>
+          </a:prstGeom>
+          <a:noFill/>
+          <a:ln>
+            <a:noFill/>
+          </a:ln>
+          <a:extLst>
+            <a:ext uri="{909E8E84-426E-40DD-AFC4-6F175D3DCCD1}">
+              <a14:hiddenFill xmlns:a14="http://schemas.microsoft.com/office/drawing/2010/main">
+                <a:solidFill>
+                  <a:schemeClr val="accent1"/>
+                </a:solidFill>
+              </a14:hiddenFill>
+            </a:ext>
+            <a:ext uri="{91240B29-F687-4F45-9708-019B960494DF}">
+              <a14:hiddenLine xmlns:a14="http://schemas.microsoft.com/office/drawing/2010/main" w="9525">
+                <a:solidFill>
+                  <a:schemeClr val="tx1"/>
+                </a:solidFill>
+                <a:miter lim="800000"/>
+                <a:headEnd/>
+                <a:tailEnd/>
+              </a14:hiddenLine>
+            </a:ext>
+          </a:extLst>
+        </p:spPr>
+      </p:pic>
+    </p:spTree>
+    <p:extLst>
+      <p:ext uri="{BB962C8B-B14F-4D97-AF65-F5344CB8AC3E}">
+        <p14:creationId xmlns:p14="http://schemas.microsoft.com/office/powerpoint/2010/main" val="2926613195"/>
+      </p:ext>
+    </p:extLst>
+  </p:cSld>
+  <p:clrMapOvr>
+    <a:masterClrMapping/>
+  </p:clrMapOvr>
+</p:sld>
+</file>
+
+<file path=ppt/slides/slide7.xml><?xml version="1.0" encoding="utf-8"?>
+<p:sld xmlns:a="http://schemas.openxmlformats.org/drawingml/2006/main" xmlns:r="http://schemas.openxmlformats.org/officeDocument/2006/relationships" xmlns:p="http://schemas.openxmlformats.org/presentationml/2006/main">
+  <p:cSld>
+    <p:spTree>
+      <p:nvGrpSpPr>
+        <p:cNvPr id="1" name=""/>
+        <p:cNvGrpSpPr/>
+        <p:nvPr/>
+      </p:nvGrpSpPr>
+      <p:grpSpPr>
+        <a:xfrm>
+          <a:off x="0" y="0"/>
+          <a:ext cx="0" cy="0"/>
+          <a:chOff x="0" y="0"/>
+          <a:chExt cx="0" cy="0"/>
+        </a:xfrm>
+      </p:grpSpPr>
+      <p:sp>
+        <p:nvSpPr>
+          <p:cNvPr id="2" name="Title 1"/>
+          <p:cNvSpPr>
+            <a:spLocks noGrp="1"/>
+          </p:cNvSpPr>
+          <p:nvPr>
+            <p:ph type="title"/>
+          </p:nvPr>
+        </p:nvSpPr>
+        <p:spPr/>
+        <p:txBody>
+          <a:bodyPr/>
+          <a:lstStyle/>
+          <a:p>
+            <a:endParaRPr lang="en-GB"/>
+          </a:p>
+        </p:txBody>
+      </p:sp>
+      <p:pic>
+        <p:nvPicPr>
+          <p:cNvPr id="4" name="Content Placeholder 3"/>
+          <p:cNvPicPr>
+            <a:picLocks noGrp="1" noChangeAspect="1"/>
+          </p:cNvPicPr>
+          <p:nvPr>
+            <p:ph idx="1"/>
+          </p:nvPr>
+        </p:nvPicPr>
+        <p:blipFill>
+          <a:blip r:embed="rId2">
+            <a:extLst>
+              <a:ext uri="{28A0092B-C50C-407E-A947-70E740481C1C}">
+                <a14:useLocalDpi xmlns:a14="http://schemas.microsoft.com/office/drawing/2010/main" val="0"/>
+              </a:ext>
+            </a:extLst>
+          </a:blip>
+          <a:stretch>
+            <a:fillRect/>
+          </a:stretch>
+        </p:blipFill>
+        <p:spPr>
+          <a:xfrm>
+            <a:off x="956864" y="1600200"/>
+            <a:ext cx="7230272" cy="4525963"/>
+          </a:xfrm>
+        </p:spPr>
+      </p:pic>
+    </p:spTree>
+    <p:extLst>
+      <p:ext uri="{BB962C8B-B14F-4D97-AF65-F5344CB8AC3E}">
+        <p14:creationId xmlns:p14="http://schemas.microsoft.com/office/powerpoint/2010/main" val="1569638172"/>
+      </p:ext>
+    </p:extLst>
+  </p:cSld>
+  <p:clrMapOvr>
+    <a:masterClrMapping/>
+  </p:clrMapOvr>
+</p:sld>
+</file>
+
+<file path=ppt/slides/slide8.xml><?xml version="1.0" encoding="utf-8"?>
+<p:sld xmlns:a="http://schemas.openxmlformats.org/drawingml/2006/main" xmlns:r="http://schemas.openxmlformats.org/officeDocument/2006/relationships" xmlns:p="http://schemas.openxmlformats.org/presentationml/2006/main">
+  <p:cSld>
+    <p:spTree>
+      <p:nvGrpSpPr>
+        <p:cNvPr id="1" name=""/>
+        <p:cNvGrpSpPr/>
+        <p:nvPr/>
+      </p:nvGrpSpPr>
+      <p:grpSpPr>
+        <a:xfrm>
+          <a:off x="0" y="0"/>
+          <a:ext cx="0" cy="0"/>
+          <a:chOff x="0" y="0"/>
+          <a:chExt cx="0" cy="0"/>
+        </a:xfrm>
+      </p:grpSpPr>
+      <p:sp>
+        <p:nvSpPr>
+          <p:cNvPr id="2" name="Title 1"/>
+          <p:cNvSpPr>
+            <a:spLocks noGrp="1"/>
+          </p:cNvSpPr>
+          <p:nvPr>
+            <p:ph type="title"/>
+          </p:nvPr>
+        </p:nvSpPr>
+        <p:spPr/>
+        <p:txBody>
+          <a:bodyPr/>
+          <a:lstStyle/>
+          <a:p>
+            <a:endParaRPr lang="en-GB"/>
+          </a:p>
+        </p:txBody>
+      </p:sp>
+      <p:pic>
+        <p:nvPicPr>
+          <p:cNvPr id="4" name="Content Placeholder 3"/>
+          <p:cNvPicPr>
+            <a:picLocks noGrp="1" noChangeAspect="1"/>
+          </p:cNvPicPr>
+          <p:nvPr>
+            <p:ph idx="1"/>
+          </p:nvPr>
+        </p:nvPicPr>
+        <p:blipFill>
+          <a:blip r:embed="rId2">
+            <a:extLst>
+              <a:ext uri="{28A0092B-C50C-407E-A947-70E740481C1C}">
+                <a14:useLocalDpi xmlns:a14="http://schemas.microsoft.com/office/drawing/2010/main" val="0"/>
+              </a:ext>
+            </a:extLst>
+          </a:blip>
+          <a:stretch>
+            <a:fillRect/>
+          </a:stretch>
+        </p:blipFill>
+        <p:spPr>
+          <a:xfrm>
+            <a:off x="942822" y="1600200"/>
+            <a:ext cx="7258355" cy="4525963"/>
+          </a:xfrm>
+        </p:spPr>
+      </p:pic>
+    </p:spTree>
+    <p:extLst>
+      <p:ext uri="{BB962C8B-B14F-4D97-AF65-F5344CB8AC3E}">
+        <p14:creationId xmlns:p14="http://schemas.microsoft.com/office/powerpoint/2010/main" val="1915374717"/>
       </p:ext>
     </p:extLst>
   </p:cSld>

</xml_diff>

<commit_message>
Presentation updated for windhoos
</commit_message>
<xml_diff>
--- a/Presentation.pptx
+++ b/Presentation.pptx
@@ -1,30 +1,125 @@
 
 <file path=ppt/presentation.xml><?xml version="1.0" encoding="utf-8"?>
-<p:presentation xmlns:a="http://schemas.openxmlformats.org/drawingml/2006/main" xmlns:p="http://schemas.openxmlformats.org/presentationml/2006/main" xmlns:r="http://schemas.openxmlformats.org/officeDocument/2006/relationships">
+<p:presentation xmlns:a="http://schemas.openxmlformats.org/drawingml/2006/main" xmlns:r="http://schemas.openxmlformats.org/officeDocument/2006/relationships" xmlns:p="http://schemas.openxmlformats.org/presentationml/2006/main">
   <p:sldMasterIdLst>
-    <p:sldMasterId id="2147483648" r:id="rId2"/>
-    <p:sldMasterId id="2147483661" r:id="rId3"/>
+    <p:sldMasterId id="2147483648" r:id="rId1"/>
+    <p:sldMasterId id="2147483661" r:id="rId2"/>
   </p:sldMasterIdLst>
   <p:sldIdLst>
-    <p:sldId id="256" r:id="rId4"/>
-    <p:sldId id="257" r:id="rId5"/>
-    <p:sldId id="258" r:id="rId6"/>
-    <p:sldId id="259" r:id="rId7"/>
-    <p:sldId id="260" r:id="rId8"/>
-    <p:sldId id="261" r:id="rId9"/>
-    <p:sldId id="262" r:id="rId10"/>
-    <p:sldId id="263" r:id="rId11"/>
-    <p:sldId id="264" r:id="rId12"/>
-    <p:sldId id="265" r:id="rId13"/>
-    <p:sldId id="266" r:id="rId14"/>
+    <p:sldId id="256" r:id="rId3"/>
+    <p:sldId id="257" r:id="rId4"/>
+    <p:sldId id="258" r:id="rId5"/>
+    <p:sldId id="259" r:id="rId6"/>
+    <p:sldId id="260" r:id="rId7"/>
+    <p:sldId id="261" r:id="rId8"/>
+    <p:sldId id="262" r:id="rId9"/>
+    <p:sldId id="263" r:id="rId10"/>
+    <p:sldId id="264" r:id="rId11"/>
+    <p:sldId id="265" r:id="rId12"/>
+    <p:sldId id="266" r:id="rId13"/>
   </p:sldIdLst>
-  <p:sldSz cx="9144000" cy="6858000"/>
-  <p:notesSz cx="7559675" cy="10691812"/>
+  <p:sldSz cx="9144000" cy="6858000" type="screen4x3"/>
+  <p:notesSz cx="7559675" cy="10691813"/>
+  <p:defaultTextStyle>
+    <a:defPPr>
+      <a:defRPr lang="nl-NL"/>
+    </a:defPPr>
+    <a:lvl1pPr marL="0" algn="l" defTabSz="914400" rtl="0" eaLnBrk="1" latinLnBrk="0" hangingPunct="1">
+      <a:defRPr sz="1800" kern="1200">
+        <a:solidFill>
+          <a:schemeClr val="tx1"/>
+        </a:solidFill>
+        <a:latin typeface="+mn-lt"/>
+        <a:ea typeface="+mn-ea"/>
+        <a:cs typeface="+mn-cs"/>
+      </a:defRPr>
+    </a:lvl1pPr>
+    <a:lvl2pPr marL="457200" algn="l" defTabSz="914400" rtl="0" eaLnBrk="1" latinLnBrk="0" hangingPunct="1">
+      <a:defRPr sz="1800" kern="1200">
+        <a:solidFill>
+          <a:schemeClr val="tx1"/>
+        </a:solidFill>
+        <a:latin typeface="+mn-lt"/>
+        <a:ea typeface="+mn-ea"/>
+        <a:cs typeface="+mn-cs"/>
+      </a:defRPr>
+    </a:lvl2pPr>
+    <a:lvl3pPr marL="914400" algn="l" defTabSz="914400" rtl="0" eaLnBrk="1" latinLnBrk="0" hangingPunct="1">
+      <a:defRPr sz="1800" kern="1200">
+        <a:solidFill>
+          <a:schemeClr val="tx1"/>
+        </a:solidFill>
+        <a:latin typeface="+mn-lt"/>
+        <a:ea typeface="+mn-ea"/>
+        <a:cs typeface="+mn-cs"/>
+      </a:defRPr>
+    </a:lvl3pPr>
+    <a:lvl4pPr marL="1371600" algn="l" defTabSz="914400" rtl="0" eaLnBrk="1" latinLnBrk="0" hangingPunct="1">
+      <a:defRPr sz="1800" kern="1200">
+        <a:solidFill>
+          <a:schemeClr val="tx1"/>
+        </a:solidFill>
+        <a:latin typeface="+mn-lt"/>
+        <a:ea typeface="+mn-ea"/>
+        <a:cs typeface="+mn-cs"/>
+      </a:defRPr>
+    </a:lvl4pPr>
+    <a:lvl5pPr marL="1828800" algn="l" defTabSz="914400" rtl="0" eaLnBrk="1" latinLnBrk="0" hangingPunct="1">
+      <a:defRPr sz="1800" kern="1200">
+        <a:solidFill>
+          <a:schemeClr val="tx1"/>
+        </a:solidFill>
+        <a:latin typeface="+mn-lt"/>
+        <a:ea typeface="+mn-ea"/>
+        <a:cs typeface="+mn-cs"/>
+      </a:defRPr>
+    </a:lvl5pPr>
+    <a:lvl6pPr marL="2286000" algn="l" defTabSz="914400" rtl="0" eaLnBrk="1" latinLnBrk="0" hangingPunct="1">
+      <a:defRPr sz="1800" kern="1200">
+        <a:solidFill>
+          <a:schemeClr val="tx1"/>
+        </a:solidFill>
+        <a:latin typeface="+mn-lt"/>
+        <a:ea typeface="+mn-ea"/>
+        <a:cs typeface="+mn-cs"/>
+      </a:defRPr>
+    </a:lvl6pPr>
+    <a:lvl7pPr marL="2743200" algn="l" defTabSz="914400" rtl="0" eaLnBrk="1" latinLnBrk="0" hangingPunct="1">
+      <a:defRPr sz="1800" kern="1200">
+        <a:solidFill>
+          <a:schemeClr val="tx1"/>
+        </a:solidFill>
+        <a:latin typeface="+mn-lt"/>
+        <a:ea typeface="+mn-ea"/>
+        <a:cs typeface="+mn-cs"/>
+      </a:defRPr>
+    </a:lvl7pPr>
+    <a:lvl8pPr marL="3200400" algn="l" defTabSz="914400" rtl="0" eaLnBrk="1" latinLnBrk="0" hangingPunct="1">
+      <a:defRPr sz="1800" kern="1200">
+        <a:solidFill>
+          <a:schemeClr val="tx1"/>
+        </a:solidFill>
+        <a:latin typeface="+mn-lt"/>
+        <a:ea typeface="+mn-ea"/>
+        <a:cs typeface="+mn-cs"/>
+      </a:defRPr>
+    </a:lvl8pPr>
+    <a:lvl9pPr marL="3657600" algn="l" defTabSz="914400" rtl="0" eaLnBrk="1" latinLnBrk="0" hangingPunct="1">
+      <a:defRPr sz="1800" kern="1200">
+        <a:solidFill>
+          <a:schemeClr val="tx1"/>
+        </a:solidFill>
+        <a:latin typeface="+mn-lt"/>
+        <a:ea typeface="+mn-ea"/>
+        <a:cs typeface="+mn-cs"/>
+      </a:defRPr>
+    </a:lvl9pPr>
+  </p:defaultTextStyle>
 </p:presentation>
 </file>
 
 <file path=ppt/slideLayouts/slideLayout1.xml><?xml version="1.0" encoding="utf-8"?>
-<p:sldLayout xmlns:a="http://schemas.openxmlformats.org/drawingml/2006/main" xmlns:p="http://schemas.openxmlformats.org/presentationml/2006/main" xmlns:r="http://schemas.openxmlformats.org/officeDocument/2006/relationships" type="blank" preserve="1">
+<p:sldLayout xmlns:a="http://schemas.openxmlformats.org/drawingml/2006/main" xmlns:r="http://schemas.openxmlformats.org/officeDocument/2006/relationships" xmlns:p="http://schemas.openxmlformats.org/presentationml/2006/main" type="blank" preserve="1">
   <p:cSld name="Blank Slide">
     <p:spTree>
       <p:nvGrpSpPr>
@@ -42,11 +137,14 @@
       </p:grpSpPr>
     </p:spTree>
   </p:cSld>
+  <p:clrMapOvr>
+    <a:masterClrMapping/>
+  </p:clrMapOvr>
 </p:sldLayout>
 </file>
 
 <file path=ppt/slideLayouts/slideLayout10.xml><?xml version="1.0" encoding="utf-8"?>
-<p:sldLayout xmlns:a="http://schemas.openxmlformats.org/drawingml/2006/main" xmlns:p="http://schemas.openxmlformats.org/presentationml/2006/main" xmlns:r="http://schemas.openxmlformats.org/officeDocument/2006/relationships" type="objOverTx" preserve="1">
+<p:sldLayout xmlns:a="http://schemas.openxmlformats.org/drawingml/2006/main" xmlns:r="http://schemas.openxmlformats.org/officeDocument/2006/relationships" xmlns:p="http://schemas.openxmlformats.org/presentationml/2006/main" type="objOverTx" preserve="1">
   <p:cSld name="Title, Content over Content">
     <p:spTree>
       <p:nvGrpSpPr>
@@ -82,7 +180,8 @@
           </a:prstGeom>
         </p:spPr>
         <p:txBody>
-          <a:bodyPr lIns="0" rIns="0" tIns="0" bIns="0" anchor="ctr"/>
+          <a:bodyPr lIns="0" tIns="0" rIns="0" bIns="0" anchor="ctr"/>
+          <a:lstStyle/>
           <a:p>
             <a:pPr algn="ctr"/>
             <a:endParaRPr/>
@@ -109,7 +208,8 @@
           </a:prstGeom>
         </p:spPr>
         <p:txBody>
-          <a:bodyPr lIns="0" rIns="0" tIns="0" bIns="0"/>
+          <a:bodyPr lIns="0" tIns="0" rIns="0" bIns="0"/>
+          <a:lstStyle/>
           <a:p>
             <a:endParaRPr/>
           </a:p>
@@ -135,7 +235,8 @@
           </a:prstGeom>
         </p:spPr>
         <p:txBody>
-          <a:bodyPr lIns="0" rIns="0" tIns="0" bIns="0"/>
+          <a:bodyPr lIns="0" tIns="0" rIns="0" bIns="0"/>
+          <a:lstStyle/>
           <a:p>
             <a:endParaRPr/>
           </a:p>
@@ -143,11 +244,14 @@
       </p:sp>
     </p:spTree>
   </p:cSld>
+  <p:clrMapOvr>
+    <a:masterClrMapping/>
+  </p:clrMapOvr>
 </p:sldLayout>
 </file>
 
 <file path=ppt/slideLayouts/slideLayout11.xml><?xml version="1.0" encoding="utf-8"?>
-<p:sldLayout xmlns:a="http://schemas.openxmlformats.org/drawingml/2006/main" xmlns:p="http://schemas.openxmlformats.org/presentationml/2006/main" xmlns:r="http://schemas.openxmlformats.org/officeDocument/2006/relationships" type="fourObj" preserve="1">
+<p:sldLayout xmlns:a="http://schemas.openxmlformats.org/drawingml/2006/main" xmlns:r="http://schemas.openxmlformats.org/officeDocument/2006/relationships" xmlns:p="http://schemas.openxmlformats.org/presentationml/2006/main" type="fourObj" preserve="1">
   <p:cSld name="Title, 4 Content">
     <p:spTree>
       <p:nvGrpSpPr>
@@ -183,7 +287,8 @@
           </a:prstGeom>
         </p:spPr>
         <p:txBody>
-          <a:bodyPr lIns="0" rIns="0" tIns="0" bIns="0" anchor="ctr"/>
+          <a:bodyPr lIns="0" tIns="0" rIns="0" bIns="0" anchor="ctr"/>
+          <a:lstStyle/>
           <a:p>
             <a:pPr algn="ctr"/>
             <a:endParaRPr/>
@@ -210,7 +315,8 @@
           </a:prstGeom>
         </p:spPr>
         <p:txBody>
-          <a:bodyPr lIns="0" rIns="0" tIns="0" bIns="0"/>
+          <a:bodyPr lIns="0" tIns="0" rIns="0" bIns="0"/>
+          <a:lstStyle/>
           <a:p>
             <a:endParaRPr/>
           </a:p>
@@ -236,7 +342,8 @@
           </a:prstGeom>
         </p:spPr>
         <p:txBody>
-          <a:bodyPr lIns="0" rIns="0" tIns="0" bIns="0"/>
+          <a:bodyPr lIns="0" tIns="0" rIns="0" bIns="0"/>
+          <a:lstStyle/>
           <a:p>
             <a:endParaRPr/>
           </a:p>
@@ -262,7 +369,8 @@
           </a:prstGeom>
         </p:spPr>
         <p:txBody>
-          <a:bodyPr lIns="0" rIns="0" tIns="0" bIns="0"/>
+          <a:bodyPr lIns="0" tIns="0" rIns="0" bIns="0"/>
+          <a:lstStyle/>
           <a:p>
             <a:endParaRPr/>
           </a:p>
@@ -288,7 +396,8 @@
           </a:prstGeom>
         </p:spPr>
         <p:txBody>
-          <a:bodyPr lIns="0" rIns="0" tIns="0" bIns="0"/>
+          <a:bodyPr lIns="0" tIns="0" rIns="0" bIns="0"/>
+          <a:lstStyle/>
           <a:p>
             <a:endParaRPr/>
           </a:p>
@@ -296,11 +405,14 @@
       </p:sp>
     </p:spTree>
   </p:cSld>
+  <p:clrMapOvr>
+    <a:masterClrMapping/>
+  </p:clrMapOvr>
 </p:sldLayout>
 </file>
 
 <file path=ppt/slideLayouts/slideLayout12.xml><?xml version="1.0" encoding="utf-8"?>
-<p:sldLayout xmlns:a="http://schemas.openxmlformats.org/drawingml/2006/main" xmlns:p="http://schemas.openxmlformats.org/presentationml/2006/main" xmlns:r="http://schemas.openxmlformats.org/officeDocument/2006/relationships" type="blank" preserve="1">
+<p:sldLayout xmlns:a="http://schemas.openxmlformats.org/drawingml/2006/main" xmlns:r="http://schemas.openxmlformats.org/officeDocument/2006/relationships" xmlns:p="http://schemas.openxmlformats.org/presentationml/2006/main" type="blank" preserve="1">
   <p:cSld name="Title, 6 Content">
     <p:spTree>
       <p:nvGrpSpPr>
@@ -336,7 +448,8 @@
           </a:prstGeom>
         </p:spPr>
         <p:txBody>
-          <a:bodyPr lIns="0" rIns="0" tIns="0" bIns="0" anchor="ctr"/>
+          <a:bodyPr lIns="0" tIns="0" rIns="0" bIns="0" anchor="ctr"/>
+          <a:lstStyle/>
           <a:p>
             <a:pPr algn="ctr"/>
             <a:endParaRPr/>
@@ -363,7 +476,8 @@
           </a:prstGeom>
         </p:spPr>
         <p:txBody>
-          <a:bodyPr lIns="0" rIns="0" tIns="0" bIns="0"/>
+          <a:bodyPr lIns="0" tIns="0" rIns="0" bIns="0"/>
+          <a:lstStyle/>
           <a:p>
             <a:endParaRPr/>
           </a:p>
@@ -389,7 +503,8 @@
           </a:prstGeom>
         </p:spPr>
         <p:txBody>
-          <a:bodyPr lIns="0" rIns="0" tIns="0" bIns="0"/>
+          <a:bodyPr lIns="0" tIns="0" rIns="0" bIns="0"/>
+          <a:lstStyle/>
           <a:p>
             <a:endParaRPr/>
           </a:p>
@@ -397,7 +512,7 @@
       </p:sp>
       <p:pic>
         <p:nvPicPr>
-          <p:cNvPr id="34" name="" descr=""/>
+          <p:cNvPr id="34" name="Afbeelding 33"/>
           <p:cNvPicPr/>
           <p:nvPr/>
         </p:nvPicPr>
@@ -422,12 +537,12 @@
       </p:pic>
       <p:pic>
         <p:nvPicPr>
-          <p:cNvPr id="35" name="" descr=""/>
+          <p:cNvPr id="35" name="Afbeelding 34"/>
           <p:cNvPicPr/>
           <p:nvPr/>
         </p:nvPicPr>
         <p:blipFill>
-          <a:blip r:embed="rId3"/>
+          <a:blip r:embed="rId2"/>
           <a:stretch>
             <a:fillRect/>
           </a:stretch>
@@ -447,11 +562,14 @@
       </p:pic>
     </p:spTree>
   </p:cSld>
+  <p:clrMapOvr>
+    <a:masterClrMapping/>
+  </p:clrMapOvr>
 </p:sldLayout>
 </file>
 
 <file path=ppt/slideLayouts/slideLayout13.xml><?xml version="1.0" encoding="utf-8"?>
-<p:sldLayout xmlns:a="http://schemas.openxmlformats.org/drawingml/2006/main" xmlns:p="http://schemas.openxmlformats.org/presentationml/2006/main" xmlns:r="http://schemas.openxmlformats.org/officeDocument/2006/relationships" type="blank" preserve="1">
+<p:sldLayout xmlns:a="http://schemas.openxmlformats.org/drawingml/2006/main" xmlns:r="http://schemas.openxmlformats.org/officeDocument/2006/relationships" xmlns:p="http://schemas.openxmlformats.org/presentationml/2006/main" type="blank" preserve="1">
   <p:cSld name="Blank Slide">
     <p:spTree>
       <p:nvGrpSpPr>
@@ -469,11 +587,14 @@
       </p:grpSpPr>
     </p:spTree>
   </p:cSld>
+  <p:clrMapOvr>
+    <a:masterClrMapping/>
+  </p:clrMapOvr>
 </p:sldLayout>
 </file>
 
 <file path=ppt/slideLayouts/slideLayout14.xml><?xml version="1.0" encoding="utf-8"?>
-<p:sldLayout xmlns:a="http://schemas.openxmlformats.org/drawingml/2006/main" xmlns:p="http://schemas.openxmlformats.org/presentationml/2006/main" xmlns:r="http://schemas.openxmlformats.org/officeDocument/2006/relationships" type="tx" preserve="1">
+<p:sldLayout xmlns:a="http://schemas.openxmlformats.org/drawingml/2006/main" xmlns:r="http://schemas.openxmlformats.org/officeDocument/2006/relationships" xmlns:p="http://schemas.openxmlformats.org/presentationml/2006/main" type="tx" preserve="1">
   <p:cSld name="Title Slide">
     <p:spTree>
       <p:nvGrpSpPr>
@@ -509,7 +630,8 @@
           </a:prstGeom>
         </p:spPr>
         <p:txBody>
-          <a:bodyPr lIns="0" rIns="0" tIns="0" bIns="0" anchor="ctr"/>
+          <a:bodyPr lIns="0" tIns="0" rIns="0" bIns="0" anchor="ctr"/>
+          <a:lstStyle/>
           <a:p>
             <a:pPr algn="ctr"/>
             <a:endParaRPr/>
@@ -536,7 +658,8 @@
           </a:prstGeom>
         </p:spPr>
         <p:txBody>
-          <a:bodyPr lIns="0" rIns="0" tIns="0" bIns="0" anchor="ctr"/>
+          <a:bodyPr lIns="0" tIns="0" rIns="0" bIns="0" anchor="ctr"/>
+          <a:lstStyle/>
           <a:p>
             <a:pPr algn="ctr"/>
             <a:endParaRPr/>
@@ -545,11 +668,14 @@
       </p:sp>
     </p:spTree>
   </p:cSld>
+  <p:clrMapOvr>
+    <a:masterClrMapping/>
+  </p:clrMapOvr>
 </p:sldLayout>
 </file>
 
 <file path=ppt/slideLayouts/slideLayout15.xml><?xml version="1.0" encoding="utf-8"?>
-<p:sldLayout xmlns:a="http://schemas.openxmlformats.org/drawingml/2006/main" xmlns:p="http://schemas.openxmlformats.org/presentationml/2006/main" xmlns:r="http://schemas.openxmlformats.org/officeDocument/2006/relationships" type="obj" preserve="1">
+<p:sldLayout xmlns:a="http://schemas.openxmlformats.org/drawingml/2006/main" xmlns:r="http://schemas.openxmlformats.org/officeDocument/2006/relationships" xmlns:p="http://schemas.openxmlformats.org/presentationml/2006/main" type="obj" preserve="1">
   <p:cSld name="Title, Content">
     <p:spTree>
       <p:nvGrpSpPr>
@@ -585,7 +711,8 @@
           </a:prstGeom>
         </p:spPr>
         <p:txBody>
-          <a:bodyPr lIns="0" rIns="0" tIns="0" bIns="0" anchor="ctr"/>
+          <a:bodyPr lIns="0" tIns="0" rIns="0" bIns="0" anchor="ctr"/>
+          <a:lstStyle/>
           <a:p>
             <a:pPr algn="ctr"/>
             <a:endParaRPr/>
@@ -612,7 +739,8 @@
           </a:prstGeom>
         </p:spPr>
         <p:txBody>
-          <a:bodyPr lIns="0" rIns="0" tIns="0" bIns="0"/>
+          <a:bodyPr lIns="0" tIns="0" rIns="0" bIns="0"/>
+          <a:lstStyle/>
           <a:p>
             <a:endParaRPr/>
           </a:p>
@@ -620,11 +748,14 @@
       </p:sp>
     </p:spTree>
   </p:cSld>
+  <p:clrMapOvr>
+    <a:masterClrMapping/>
+  </p:clrMapOvr>
 </p:sldLayout>
 </file>
 
 <file path=ppt/slideLayouts/slideLayout16.xml><?xml version="1.0" encoding="utf-8"?>
-<p:sldLayout xmlns:a="http://schemas.openxmlformats.org/drawingml/2006/main" xmlns:p="http://schemas.openxmlformats.org/presentationml/2006/main" xmlns:r="http://schemas.openxmlformats.org/officeDocument/2006/relationships" type="twoObj" preserve="1">
+<p:sldLayout xmlns:a="http://schemas.openxmlformats.org/drawingml/2006/main" xmlns:r="http://schemas.openxmlformats.org/officeDocument/2006/relationships" xmlns:p="http://schemas.openxmlformats.org/presentationml/2006/main" type="twoObj" preserve="1">
   <p:cSld name="Title, 2 Content">
     <p:spTree>
       <p:nvGrpSpPr>
@@ -660,7 +791,8 @@
           </a:prstGeom>
         </p:spPr>
         <p:txBody>
-          <a:bodyPr lIns="0" rIns="0" tIns="0" bIns="0" anchor="ctr"/>
+          <a:bodyPr lIns="0" tIns="0" rIns="0" bIns="0" anchor="ctr"/>
+          <a:lstStyle/>
           <a:p>
             <a:pPr algn="ctr"/>
             <a:endParaRPr/>
@@ -687,7 +819,8 @@
           </a:prstGeom>
         </p:spPr>
         <p:txBody>
-          <a:bodyPr lIns="0" rIns="0" tIns="0" bIns="0"/>
+          <a:bodyPr lIns="0" tIns="0" rIns="0" bIns="0"/>
+          <a:lstStyle/>
           <a:p>
             <a:endParaRPr/>
           </a:p>
@@ -713,7 +846,8 @@
           </a:prstGeom>
         </p:spPr>
         <p:txBody>
-          <a:bodyPr lIns="0" rIns="0" tIns="0" bIns="0"/>
+          <a:bodyPr lIns="0" tIns="0" rIns="0" bIns="0"/>
+          <a:lstStyle/>
           <a:p>
             <a:endParaRPr/>
           </a:p>
@@ -721,11 +855,14 @@
       </p:sp>
     </p:spTree>
   </p:cSld>
+  <p:clrMapOvr>
+    <a:masterClrMapping/>
+  </p:clrMapOvr>
 </p:sldLayout>
 </file>
 
 <file path=ppt/slideLayouts/slideLayout17.xml><?xml version="1.0" encoding="utf-8"?>
-<p:sldLayout xmlns:a="http://schemas.openxmlformats.org/drawingml/2006/main" xmlns:p="http://schemas.openxmlformats.org/presentationml/2006/main" xmlns:r="http://schemas.openxmlformats.org/officeDocument/2006/relationships" type="titleOnly" preserve="1">
+<p:sldLayout xmlns:a="http://schemas.openxmlformats.org/drawingml/2006/main" xmlns:r="http://schemas.openxmlformats.org/officeDocument/2006/relationships" xmlns:p="http://schemas.openxmlformats.org/presentationml/2006/main" type="titleOnly" preserve="1">
   <p:cSld name="Title Only">
     <p:spTree>
       <p:nvGrpSpPr>
@@ -761,7 +898,8 @@
           </a:prstGeom>
         </p:spPr>
         <p:txBody>
-          <a:bodyPr lIns="0" rIns="0" tIns="0" bIns="0" anchor="ctr"/>
+          <a:bodyPr lIns="0" tIns="0" rIns="0" bIns="0" anchor="ctr"/>
+          <a:lstStyle/>
           <a:p>
             <a:pPr algn="ctr"/>
             <a:endParaRPr/>
@@ -770,11 +908,14 @@
       </p:sp>
     </p:spTree>
   </p:cSld>
+  <p:clrMapOvr>
+    <a:masterClrMapping/>
+  </p:clrMapOvr>
 </p:sldLayout>
 </file>
 
 <file path=ppt/slideLayouts/slideLayout18.xml><?xml version="1.0" encoding="utf-8"?>
-<p:sldLayout xmlns:a="http://schemas.openxmlformats.org/drawingml/2006/main" xmlns:p="http://schemas.openxmlformats.org/presentationml/2006/main" xmlns:r="http://schemas.openxmlformats.org/officeDocument/2006/relationships" type="objOnly" preserve="1">
+<p:sldLayout xmlns:a="http://schemas.openxmlformats.org/drawingml/2006/main" xmlns:r="http://schemas.openxmlformats.org/officeDocument/2006/relationships" xmlns:p="http://schemas.openxmlformats.org/presentationml/2006/main" type="objOnly" preserve="1">
   <p:cSld name="Centered Text">
     <p:spTree>
       <p:nvGrpSpPr>
@@ -810,7 +951,8 @@
           </a:prstGeom>
         </p:spPr>
         <p:txBody>
-          <a:bodyPr lIns="0" rIns="0" tIns="0" bIns="0" anchor="ctr"/>
+          <a:bodyPr lIns="0" tIns="0" rIns="0" bIns="0" anchor="ctr"/>
+          <a:lstStyle/>
           <a:p>
             <a:pPr algn="ctr"/>
             <a:endParaRPr/>
@@ -819,11 +961,14 @@
       </p:sp>
     </p:spTree>
   </p:cSld>
+  <p:clrMapOvr>
+    <a:masterClrMapping/>
+  </p:clrMapOvr>
 </p:sldLayout>
 </file>
 
 <file path=ppt/slideLayouts/slideLayout19.xml><?xml version="1.0" encoding="utf-8"?>
-<p:sldLayout xmlns:a="http://schemas.openxmlformats.org/drawingml/2006/main" xmlns:p="http://schemas.openxmlformats.org/presentationml/2006/main" xmlns:r="http://schemas.openxmlformats.org/officeDocument/2006/relationships" type="twoObjAndObj" preserve="1">
+<p:sldLayout xmlns:a="http://schemas.openxmlformats.org/drawingml/2006/main" xmlns:r="http://schemas.openxmlformats.org/officeDocument/2006/relationships" xmlns:p="http://schemas.openxmlformats.org/presentationml/2006/main" type="twoObjAndObj" preserve="1">
   <p:cSld name="Title, 2 Content and Content">
     <p:spTree>
       <p:nvGrpSpPr>
@@ -859,7 +1004,8 @@
           </a:prstGeom>
         </p:spPr>
         <p:txBody>
-          <a:bodyPr lIns="0" rIns="0" tIns="0" bIns="0" anchor="ctr"/>
+          <a:bodyPr lIns="0" tIns="0" rIns="0" bIns="0" anchor="ctr"/>
+          <a:lstStyle/>
           <a:p>
             <a:pPr algn="ctr"/>
             <a:endParaRPr/>
@@ -886,7 +1032,8 @@
           </a:prstGeom>
         </p:spPr>
         <p:txBody>
-          <a:bodyPr lIns="0" rIns="0" tIns="0" bIns="0"/>
+          <a:bodyPr lIns="0" tIns="0" rIns="0" bIns="0"/>
+          <a:lstStyle/>
           <a:p>
             <a:endParaRPr/>
           </a:p>
@@ -912,7 +1059,8 @@
           </a:prstGeom>
         </p:spPr>
         <p:txBody>
-          <a:bodyPr lIns="0" rIns="0" tIns="0" bIns="0"/>
+          <a:bodyPr lIns="0" tIns="0" rIns="0" bIns="0"/>
+          <a:lstStyle/>
           <a:p>
             <a:endParaRPr/>
           </a:p>
@@ -938,7 +1086,8 @@
           </a:prstGeom>
         </p:spPr>
         <p:txBody>
-          <a:bodyPr lIns="0" rIns="0" tIns="0" bIns="0"/>
+          <a:bodyPr lIns="0" tIns="0" rIns="0" bIns="0"/>
+          <a:lstStyle/>
           <a:p>
             <a:endParaRPr/>
           </a:p>
@@ -946,11 +1095,14 @@
       </p:sp>
     </p:spTree>
   </p:cSld>
+  <p:clrMapOvr>
+    <a:masterClrMapping/>
+  </p:clrMapOvr>
 </p:sldLayout>
 </file>
 
 <file path=ppt/slideLayouts/slideLayout2.xml><?xml version="1.0" encoding="utf-8"?>
-<p:sldLayout xmlns:a="http://schemas.openxmlformats.org/drawingml/2006/main" xmlns:p="http://schemas.openxmlformats.org/presentationml/2006/main" xmlns:r="http://schemas.openxmlformats.org/officeDocument/2006/relationships" type="tx" preserve="1">
+<p:sldLayout xmlns:a="http://schemas.openxmlformats.org/drawingml/2006/main" xmlns:r="http://schemas.openxmlformats.org/officeDocument/2006/relationships" xmlns:p="http://schemas.openxmlformats.org/presentationml/2006/main" type="tx" preserve="1">
   <p:cSld name="Title Slide">
     <p:spTree>
       <p:nvGrpSpPr>
@@ -986,7 +1138,8 @@
           </a:prstGeom>
         </p:spPr>
         <p:txBody>
-          <a:bodyPr lIns="0" rIns="0" tIns="0" bIns="0" anchor="ctr"/>
+          <a:bodyPr lIns="0" tIns="0" rIns="0" bIns="0" anchor="ctr"/>
+          <a:lstStyle/>
           <a:p>
             <a:pPr algn="ctr"/>
             <a:endParaRPr/>
@@ -1013,7 +1166,8 @@
           </a:prstGeom>
         </p:spPr>
         <p:txBody>
-          <a:bodyPr lIns="0" rIns="0" tIns="0" bIns="0" anchor="ctr"/>
+          <a:bodyPr lIns="0" tIns="0" rIns="0" bIns="0" anchor="ctr"/>
+          <a:lstStyle/>
           <a:p>
             <a:pPr algn="ctr"/>
             <a:endParaRPr/>
@@ -1022,11 +1176,14 @@
       </p:sp>
     </p:spTree>
   </p:cSld>
+  <p:clrMapOvr>
+    <a:masterClrMapping/>
+  </p:clrMapOvr>
 </p:sldLayout>
 </file>
 
 <file path=ppt/slideLayouts/slideLayout20.xml><?xml version="1.0" encoding="utf-8"?>
-<p:sldLayout xmlns:a="http://schemas.openxmlformats.org/drawingml/2006/main" xmlns:p="http://schemas.openxmlformats.org/presentationml/2006/main" xmlns:r="http://schemas.openxmlformats.org/officeDocument/2006/relationships" type="objAndTwoObj" preserve="1">
+<p:sldLayout xmlns:a="http://schemas.openxmlformats.org/drawingml/2006/main" xmlns:r="http://schemas.openxmlformats.org/officeDocument/2006/relationships" xmlns:p="http://schemas.openxmlformats.org/presentationml/2006/main" type="objAndTwoObj" preserve="1">
   <p:cSld name="Title Content and 2 Content">
     <p:spTree>
       <p:nvGrpSpPr>
@@ -1062,7 +1219,8 @@
           </a:prstGeom>
         </p:spPr>
         <p:txBody>
-          <a:bodyPr lIns="0" rIns="0" tIns="0" bIns="0" anchor="ctr"/>
+          <a:bodyPr lIns="0" tIns="0" rIns="0" bIns="0" anchor="ctr"/>
+          <a:lstStyle/>
           <a:p>
             <a:pPr algn="ctr"/>
             <a:endParaRPr/>
@@ -1089,7 +1247,8 @@
           </a:prstGeom>
         </p:spPr>
         <p:txBody>
-          <a:bodyPr lIns="0" rIns="0" tIns="0" bIns="0"/>
+          <a:bodyPr lIns="0" tIns="0" rIns="0" bIns="0"/>
+          <a:lstStyle/>
           <a:p>
             <a:endParaRPr/>
           </a:p>
@@ -1115,7 +1274,8 @@
           </a:prstGeom>
         </p:spPr>
         <p:txBody>
-          <a:bodyPr lIns="0" rIns="0" tIns="0" bIns="0"/>
+          <a:bodyPr lIns="0" tIns="0" rIns="0" bIns="0"/>
+          <a:lstStyle/>
           <a:p>
             <a:endParaRPr/>
           </a:p>
@@ -1141,7 +1301,8 @@
           </a:prstGeom>
         </p:spPr>
         <p:txBody>
-          <a:bodyPr lIns="0" rIns="0" tIns="0" bIns="0"/>
+          <a:bodyPr lIns="0" tIns="0" rIns="0" bIns="0"/>
+          <a:lstStyle/>
           <a:p>
             <a:endParaRPr/>
           </a:p>
@@ -1149,11 +1310,14 @@
       </p:sp>
     </p:spTree>
   </p:cSld>
+  <p:clrMapOvr>
+    <a:masterClrMapping/>
+  </p:clrMapOvr>
 </p:sldLayout>
 </file>
 
 <file path=ppt/slideLayouts/slideLayout21.xml><?xml version="1.0" encoding="utf-8"?>
-<p:sldLayout xmlns:a="http://schemas.openxmlformats.org/drawingml/2006/main" xmlns:p="http://schemas.openxmlformats.org/presentationml/2006/main" xmlns:r="http://schemas.openxmlformats.org/officeDocument/2006/relationships" type="twoObjOverTx" preserve="1">
+<p:sldLayout xmlns:a="http://schemas.openxmlformats.org/drawingml/2006/main" xmlns:r="http://schemas.openxmlformats.org/officeDocument/2006/relationships" xmlns:p="http://schemas.openxmlformats.org/presentationml/2006/main" type="twoObjOverTx" preserve="1">
   <p:cSld name="Title, 2 Content over Content">
     <p:spTree>
       <p:nvGrpSpPr>
@@ -1189,7 +1353,8 @@
           </a:prstGeom>
         </p:spPr>
         <p:txBody>
-          <a:bodyPr lIns="0" rIns="0" tIns="0" bIns="0" anchor="ctr"/>
+          <a:bodyPr lIns="0" tIns="0" rIns="0" bIns="0" anchor="ctr"/>
+          <a:lstStyle/>
           <a:p>
             <a:pPr algn="ctr"/>
             <a:endParaRPr/>
@@ -1216,7 +1381,8 @@
           </a:prstGeom>
         </p:spPr>
         <p:txBody>
-          <a:bodyPr lIns="0" rIns="0" tIns="0" bIns="0"/>
+          <a:bodyPr lIns="0" tIns="0" rIns="0" bIns="0"/>
+          <a:lstStyle/>
           <a:p>
             <a:endParaRPr/>
           </a:p>
@@ -1242,7 +1408,8 @@
           </a:prstGeom>
         </p:spPr>
         <p:txBody>
-          <a:bodyPr lIns="0" rIns="0" tIns="0" bIns="0"/>
+          <a:bodyPr lIns="0" tIns="0" rIns="0" bIns="0"/>
+          <a:lstStyle/>
           <a:p>
             <a:endParaRPr/>
           </a:p>
@@ -1268,7 +1435,8 @@
           </a:prstGeom>
         </p:spPr>
         <p:txBody>
-          <a:bodyPr lIns="0" rIns="0" tIns="0" bIns="0"/>
+          <a:bodyPr lIns="0" tIns="0" rIns="0" bIns="0"/>
+          <a:lstStyle/>
           <a:p>
             <a:endParaRPr/>
           </a:p>
@@ -1276,11 +1444,14 @@
       </p:sp>
     </p:spTree>
   </p:cSld>
+  <p:clrMapOvr>
+    <a:masterClrMapping/>
+  </p:clrMapOvr>
 </p:sldLayout>
 </file>
 
 <file path=ppt/slideLayouts/slideLayout22.xml><?xml version="1.0" encoding="utf-8"?>
-<p:sldLayout xmlns:a="http://schemas.openxmlformats.org/drawingml/2006/main" xmlns:p="http://schemas.openxmlformats.org/presentationml/2006/main" xmlns:r="http://schemas.openxmlformats.org/officeDocument/2006/relationships" type="objOverTx" preserve="1">
+<p:sldLayout xmlns:a="http://schemas.openxmlformats.org/drawingml/2006/main" xmlns:r="http://schemas.openxmlformats.org/officeDocument/2006/relationships" xmlns:p="http://schemas.openxmlformats.org/presentationml/2006/main" type="objOverTx" preserve="1">
   <p:cSld name="Title, Content over Content">
     <p:spTree>
       <p:nvGrpSpPr>
@@ -1316,7 +1487,8 @@
           </a:prstGeom>
         </p:spPr>
         <p:txBody>
-          <a:bodyPr lIns="0" rIns="0" tIns="0" bIns="0" anchor="ctr"/>
+          <a:bodyPr lIns="0" tIns="0" rIns="0" bIns="0" anchor="ctr"/>
+          <a:lstStyle/>
           <a:p>
             <a:pPr algn="ctr"/>
             <a:endParaRPr/>
@@ -1343,7 +1515,8 @@
           </a:prstGeom>
         </p:spPr>
         <p:txBody>
-          <a:bodyPr lIns="0" rIns="0" tIns="0" bIns="0"/>
+          <a:bodyPr lIns="0" tIns="0" rIns="0" bIns="0"/>
+          <a:lstStyle/>
           <a:p>
             <a:endParaRPr/>
           </a:p>
@@ -1369,7 +1542,8 @@
           </a:prstGeom>
         </p:spPr>
         <p:txBody>
-          <a:bodyPr lIns="0" rIns="0" tIns="0" bIns="0"/>
+          <a:bodyPr lIns="0" tIns="0" rIns="0" bIns="0"/>
+          <a:lstStyle/>
           <a:p>
             <a:endParaRPr/>
           </a:p>
@@ -1377,11 +1551,14 @@
       </p:sp>
     </p:spTree>
   </p:cSld>
+  <p:clrMapOvr>
+    <a:masterClrMapping/>
+  </p:clrMapOvr>
 </p:sldLayout>
 </file>
 
 <file path=ppt/slideLayouts/slideLayout23.xml><?xml version="1.0" encoding="utf-8"?>
-<p:sldLayout xmlns:a="http://schemas.openxmlformats.org/drawingml/2006/main" xmlns:p="http://schemas.openxmlformats.org/presentationml/2006/main" xmlns:r="http://schemas.openxmlformats.org/officeDocument/2006/relationships" type="fourObj" preserve="1">
+<p:sldLayout xmlns:a="http://schemas.openxmlformats.org/drawingml/2006/main" xmlns:r="http://schemas.openxmlformats.org/officeDocument/2006/relationships" xmlns:p="http://schemas.openxmlformats.org/presentationml/2006/main" type="fourObj" preserve="1">
   <p:cSld name="Title, 4 Content">
     <p:spTree>
       <p:nvGrpSpPr>
@@ -1417,7 +1594,8 @@
           </a:prstGeom>
         </p:spPr>
         <p:txBody>
-          <a:bodyPr lIns="0" rIns="0" tIns="0" bIns="0" anchor="ctr"/>
+          <a:bodyPr lIns="0" tIns="0" rIns="0" bIns="0" anchor="ctr"/>
+          <a:lstStyle/>
           <a:p>
             <a:pPr algn="ctr"/>
             <a:endParaRPr/>
@@ -1444,7 +1622,8 @@
           </a:prstGeom>
         </p:spPr>
         <p:txBody>
-          <a:bodyPr lIns="0" rIns="0" tIns="0" bIns="0"/>
+          <a:bodyPr lIns="0" tIns="0" rIns="0" bIns="0"/>
+          <a:lstStyle/>
           <a:p>
             <a:endParaRPr/>
           </a:p>
@@ -1470,7 +1649,8 @@
           </a:prstGeom>
         </p:spPr>
         <p:txBody>
-          <a:bodyPr lIns="0" rIns="0" tIns="0" bIns="0"/>
+          <a:bodyPr lIns="0" tIns="0" rIns="0" bIns="0"/>
+          <a:lstStyle/>
           <a:p>
             <a:endParaRPr/>
           </a:p>
@@ -1496,7 +1676,8 @@
           </a:prstGeom>
         </p:spPr>
         <p:txBody>
-          <a:bodyPr lIns="0" rIns="0" tIns="0" bIns="0"/>
+          <a:bodyPr lIns="0" tIns="0" rIns="0" bIns="0"/>
+          <a:lstStyle/>
           <a:p>
             <a:endParaRPr/>
           </a:p>
@@ -1522,7 +1703,8 @@
           </a:prstGeom>
         </p:spPr>
         <p:txBody>
-          <a:bodyPr lIns="0" rIns="0" tIns="0" bIns="0"/>
+          <a:bodyPr lIns="0" tIns="0" rIns="0" bIns="0"/>
+          <a:lstStyle/>
           <a:p>
             <a:endParaRPr/>
           </a:p>
@@ -1530,11 +1712,14 @@
       </p:sp>
     </p:spTree>
   </p:cSld>
+  <p:clrMapOvr>
+    <a:masterClrMapping/>
+  </p:clrMapOvr>
 </p:sldLayout>
 </file>
 
 <file path=ppt/slideLayouts/slideLayout24.xml><?xml version="1.0" encoding="utf-8"?>
-<p:sldLayout xmlns:a="http://schemas.openxmlformats.org/drawingml/2006/main" xmlns:p="http://schemas.openxmlformats.org/presentationml/2006/main" xmlns:r="http://schemas.openxmlformats.org/officeDocument/2006/relationships" type="blank" preserve="1">
+<p:sldLayout xmlns:a="http://schemas.openxmlformats.org/drawingml/2006/main" xmlns:r="http://schemas.openxmlformats.org/officeDocument/2006/relationships" xmlns:p="http://schemas.openxmlformats.org/presentationml/2006/main" type="blank" preserve="1">
   <p:cSld name="Title, 6 Content">
     <p:spTree>
       <p:nvGrpSpPr>
@@ -1570,7 +1755,8 @@
           </a:prstGeom>
         </p:spPr>
         <p:txBody>
-          <a:bodyPr lIns="0" rIns="0" tIns="0" bIns="0" anchor="ctr"/>
+          <a:bodyPr lIns="0" tIns="0" rIns="0" bIns="0" anchor="ctr"/>
+          <a:lstStyle/>
           <a:p>
             <a:pPr algn="ctr"/>
             <a:endParaRPr/>
@@ -1597,7 +1783,8 @@
           </a:prstGeom>
         </p:spPr>
         <p:txBody>
-          <a:bodyPr lIns="0" rIns="0" tIns="0" bIns="0"/>
+          <a:bodyPr lIns="0" tIns="0" rIns="0" bIns="0"/>
+          <a:lstStyle/>
           <a:p>
             <a:endParaRPr/>
           </a:p>
@@ -1623,7 +1810,8 @@
           </a:prstGeom>
         </p:spPr>
         <p:txBody>
-          <a:bodyPr lIns="0" rIns="0" tIns="0" bIns="0"/>
+          <a:bodyPr lIns="0" tIns="0" rIns="0" bIns="0"/>
+          <a:lstStyle/>
           <a:p>
             <a:endParaRPr/>
           </a:p>
@@ -1631,7 +1819,7 @@
       </p:sp>
       <p:pic>
         <p:nvPicPr>
-          <p:cNvPr id="70" name="" descr=""/>
+          <p:cNvPr id="70" name="Afbeelding 69"/>
           <p:cNvPicPr/>
           <p:nvPr/>
         </p:nvPicPr>
@@ -1656,12 +1844,12 @@
       </p:pic>
       <p:pic>
         <p:nvPicPr>
-          <p:cNvPr id="71" name="" descr=""/>
+          <p:cNvPr id="71" name="Afbeelding 70"/>
           <p:cNvPicPr/>
           <p:nvPr/>
         </p:nvPicPr>
         <p:blipFill>
-          <a:blip r:embed="rId3"/>
+          <a:blip r:embed="rId2"/>
           <a:stretch>
             <a:fillRect/>
           </a:stretch>
@@ -1681,11 +1869,14 @@
       </p:pic>
     </p:spTree>
   </p:cSld>
+  <p:clrMapOvr>
+    <a:masterClrMapping/>
+  </p:clrMapOvr>
 </p:sldLayout>
 </file>
 
 <file path=ppt/slideLayouts/slideLayout3.xml><?xml version="1.0" encoding="utf-8"?>
-<p:sldLayout xmlns:a="http://schemas.openxmlformats.org/drawingml/2006/main" xmlns:p="http://schemas.openxmlformats.org/presentationml/2006/main" xmlns:r="http://schemas.openxmlformats.org/officeDocument/2006/relationships" type="obj" preserve="1">
+<p:sldLayout xmlns:a="http://schemas.openxmlformats.org/drawingml/2006/main" xmlns:r="http://schemas.openxmlformats.org/officeDocument/2006/relationships" xmlns:p="http://schemas.openxmlformats.org/presentationml/2006/main" type="obj" preserve="1">
   <p:cSld name="Title, Content">
     <p:spTree>
       <p:nvGrpSpPr>
@@ -1721,7 +1912,8 @@
           </a:prstGeom>
         </p:spPr>
         <p:txBody>
-          <a:bodyPr lIns="0" rIns="0" tIns="0" bIns="0" anchor="ctr"/>
+          <a:bodyPr lIns="0" tIns="0" rIns="0" bIns="0" anchor="ctr"/>
+          <a:lstStyle/>
           <a:p>
             <a:pPr algn="ctr"/>
             <a:endParaRPr/>
@@ -1748,7 +1940,8 @@
           </a:prstGeom>
         </p:spPr>
         <p:txBody>
-          <a:bodyPr lIns="0" rIns="0" tIns="0" bIns="0"/>
+          <a:bodyPr lIns="0" tIns="0" rIns="0" bIns="0"/>
+          <a:lstStyle/>
           <a:p>
             <a:endParaRPr/>
           </a:p>
@@ -1756,11 +1949,14 @@
       </p:sp>
     </p:spTree>
   </p:cSld>
+  <p:clrMapOvr>
+    <a:masterClrMapping/>
+  </p:clrMapOvr>
 </p:sldLayout>
 </file>
 
 <file path=ppt/slideLayouts/slideLayout4.xml><?xml version="1.0" encoding="utf-8"?>
-<p:sldLayout xmlns:a="http://schemas.openxmlformats.org/drawingml/2006/main" xmlns:p="http://schemas.openxmlformats.org/presentationml/2006/main" xmlns:r="http://schemas.openxmlformats.org/officeDocument/2006/relationships" type="twoObj" preserve="1">
+<p:sldLayout xmlns:a="http://schemas.openxmlformats.org/drawingml/2006/main" xmlns:r="http://schemas.openxmlformats.org/officeDocument/2006/relationships" xmlns:p="http://schemas.openxmlformats.org/presentationml/2006/main" type="twoObj" preserve="1">
   <p:cSld name="Title, 2 Content">
     <p:spTree>
       <p:nvGrpSpPr>
@@ -1796,7 +1992,8 @@
           </a:prstGeom>
         </p:spPr>
         <p:txBody>
-          <a:bodyPr lIns="0" rIns="0" tIns="0" bIns="0" anchor="ctr"/>
+          <a:bodyPr lIns="0" tIns="0" rIns="0" bIns="0" anchor="ctr"/>
+          <a:lstStyle/>
           <a:p>
             <a:pPr algn="ctr"/>
             <a:endParaRPr/>
@@ -1823,7 +2020,8 @@
           </a:prstGeom>
         </p:spPr>
         <p:txBody>
-          <a:bodyPr lIns="0" rIns="0" tIns="0" bIns="0"/>
+          <a:bodyPr lIns="0" tIns="0" rIns="0" bIns="0"/>
+          <a:lstStyle/>
           <a:p>
             <a:endParaRPr/>
           </a:p>
@@ -1849,7 +2047,8 @@
           </a:prstGeom>
         </p:spPr>
         <p:txBody>
-          <a:bodyPr lIns="0" rIns="0" tIns="0" bIns="0"/>
+          <a:bodyPr lIns="0" tIns="0" rIns="0" bIns="0"/>
+          <a:lstStyle/>
           <a:p>
             <a:endParaRPr/>
           </a:p>
@@ -1857,11 +2056,14 @@
       </p:sp>
     </p:spTree>
   </p:cSld>
+  <p:clrMapOvr>
+    <a:masterClrMapping/>
+  </p:clrMapOvr>
 </p:sldLayout>
 </file>
 
 <file path=ppt/slideLayouts/slideLayout5.xml><?xml version="1.0" encoding="utf-8"?>
-<p:sldLayout xmlns:a="http://schemas.openxmlformats.org/drawingml/2006/main" xmlns:p="http://schemas.openxmlformats.org/presentationml/2006/main" xmlns:r="http://schemas.openxmlformats.org/officeDocument/2006/relationships" type="titleOnly" preserve="1">
+<p:sldLayout xmlns:a="http://schemas.openxmlformats.org/drawingml/2006/main" xmlns:r="http://schemas.openxmlformats.org/officeDocument/2006/relationships" xmlns:p="http://schemas.openxmlformats.org/presentationml/2006/main" type="titleOnly" preserve="1">
   <p:cSld name="Title Only">
     <p:spTree>
       <p:nvGrpSpPr>
@@ -1897,7 +2099,8 @@
           </a:prstGeom>
         </p:spPr>
         <p:txBody>
-          <a:bodyPr lIns="0" rIns="0" tIns="0" bIns="0" anchor="ctr"/>
+          <a:bodyPr lIns="0" tIns="0" rIns="0" bIns="0" anchor="ctr"/>
+          <a:lstStyle/>
           <a:p>
             <a:pPr algn="ctr"/>
             <a:endParaRPr/>
@@ -1906,11 +2109,14 @@
       </p:sp>
     </p:spTree>
   </p:cSld>
+  <p:clrMapOvr>
+    <a:masterClrMapping/>
+  </p:clrMapOvr>
 </p:sldLayout>
 </file>
 
 <file path=ppt/slideLayouts/slideLayout6.xml><?xml version="1.0" encoding="utf-8"?>
-<p:sldLayout xmlns:a="http://schemas.openxmlformats.org/drawingml/2006/main" xmlns:p="http://schemas.openxmlformats.org/presentationml/2006/main" xmlns:r="http://schemas.openxmlformats.org/officeDocument/2006/relationships" type="objOnly" preserve="1">
+<p:sldLayout xmlns:a="http://schemas.openxmlformats.org/drawingml/2006/main" xmlns:r="http://schemas.openxmlformats.org/officeDocument/2006/relationships" xmlns:p="http://schemas.openxmlformats.org/presentationml/2006/main" type="objOnly" preserve="1">
   <p:cSld name="Centered Text">
     <p:spTree>
       <p:nvGrpSpPr>
@@ -1946,7 +2152,8 @@
           </a:prstGeom>
         </p:spPr>
         <p:txBody>
-          <a:bodyPr lIns="0" rIns="0" tIns="0" bIns="0" anchor="ctr"/>
+          <a:bodyPr lIns="0" tIns="0" rIns="0" bIns="0" anchor="ctr"/>
+          <a:lstStyle/>
           <a:p>
             <a:pPr algn="ctr"/>
             <a:endParaRPr/>
@@ -1955,11 +2162,14 @@
       </p:sp>
     </p:spTree>
   </p:cSld>
+  <p:clrMapOvr>
+    <a:masterClrMapping/>
+  </p:clrMapOvr>
 </p:sldLayout>
 </file>
 
 <file path=ppt/slideLayouts/slideLayout7.xml><?xml version="1.0" encoding="utf-8"?>
-<p:sldLayout xmlns:a="http://schemas.openxmlformats.org/drawingml/2006/main" xmlns:p="http://schemas.openxmlformats.org/presentationml/2006/main" xmlns:r="http://schemas.openxmlformats.org/officeDocument/2006/relationships" type="twoObjAndObj" preserve="1">
+<p:sldLayout xmlns:a="http://schemas.openxmlformats.org/drawingml/2006/main" xmlns:r="http://schemas.openxmlformats.org/officeDocument/2006/relationships" xmlns:p="http://schemas.openxmlformats.org/presentationml/2006/main" type="twoObjAndObj" preserve="1">
   <p:cSld name="Title, 2 Content and Content">
     <p:spTree>
       <p:nvGrpSpPr>
@@ -1995,7 +2205,8 @@
           </a:prstGeom>
         </p:spPr>
         <p:txBody>
-          <a:bodyPr lIns="0" rIns="0" tIns="0" bIns="0" anchor="ctr"/>
+          <a:bodyPr lIns="0" tIns="0" rIns="0" bIns="0" anchor="ctr"/>
+          <a:lstStyle/>
           <a:p>
             <a:pPr algn="ctr"/>
             <a:endParaRPr/>
@@ -2022,7 +2233,8 @@
           </a:prstGeom>
         </p:spPr>
         <p:txBody>
-          <a:bodyPr lIns="0" rIns="0" tIns="0" bIns="0"/>
+          <a:bodyPr lIns="0" tIns="0" rIns="0" bIns="0"/>
+          <a:lstStyle/>
           <a:p>
             <a:endParaRPr/>
           </a:p>
@@ -2048,7 +2260,8 @@
           </a:prstGeom>
         </p:spPr>
         <p:txBody>
-          <a:bodyPr lIns="0" rIns="0" tIns="0" bIns="0"/>
+          <a:bodyPr lIns="0" tIns="0" rIns="0" bIns="0"/>
+          <a:lstStyle/>
           <a:p>
             <a:endParaRPr/>
           </a:p>
@@ -2074,7 +2287,8 @@
           </a:prstGeom>
         </p:spPr>
         <p:txBody>
-          <a:bodyPr lIns="0" rIns="0" tIns="0" bIns="0"/>
+          <a:bodyPr lIns="0" tIns="0" rIns="0" bIns="0"/>
+          <a:lstStyle/>
           <a:p>
             <a:endParaRPr/>
           </a:p>
@@ -2082,11 +2296,14 @@
       </p:sp>
     </p:spTree>
   </p:cSld>
+  <p:clrMapOvr>
+    <a:masterClrMapping/>
+  </p:clrMapOvr>
 </p:sldLayout>
 </file>
 
 <file path=ppt/slideLayouts/slideLayout8.xml><?xml version="1.0" encoding="utf-8"?>
-<p:sldLayout xmlns:a="http://schemas.openxmlformats.org/drawingml/2006/main" xmlns:p="http://schemas.openxmlformats.org/presentationml/2006/main" xmlns:r="http://schemas.openxmlformats.org/officeDocument/2006/relationships" type="objAndTwoObj" preserve="1">
+<p:sldLayout xmlns:a="http://schemas.openxmlformats.org/drawingml/2006/main" xmlns:r="http://schemas.openxmlformats.org/officeDocument/2006/relationships" xmlns:p="http://schemas.openxmlformats.org/presentationml/2006/main" type="objAndTwoObj" preserve="1">
   <p:cSld name="Title Content and 2 Content">
     <p:spTree>
       <p:nvGrpSpPr>
@@ -2122,7 +2339,8 @@
           </a:prstGeom>
         </p:spPr>
         <p:txBody>
-          <a:bodyPr lIns="0" rIns="0" tIns="0" bIns="0" anchor="ctr"/>
+          <a:bodyPr lIns="0" tIns="0" rIns="0" bIns="0" anchor="ctr"/>
+          <a:lstStyle/>
           <a:p>
             <a:pPr algn="ctr"/>
             <a:endParaRPr/>
@@ -2149,7 +2367,8 @@
           </a:prstGeom>
         </p:spPr>
         <p:txBody>
-          <a:bodyPr lIns="0" rIns="0" tIns="0" bIns="0"/>
+          <a:bodyPr lIns="0" tIns="0" rIns="0" bIns="0"/>
+          <a:lstStyle/>
           <a:p>
             <a:endParaRPr/>
           </a:p>
@@ -2175,7 +2394,8 @@
           </a:prstGeom>
         </p:spPr>
         <p:txBody>
-          <a:bodyPr lIns="0" rIns="0" tIns="0" bIns="0"/>
+          <a:bodyPr lIns="0" tIns="0" rIns="0" bIns="0"/>
+          <a:lstStyle/>
           <a:p>
             <a:endParaRPr/>
           </a:p>
@@ -2201,7 +2421,8 @@
           </a:prstGeom>
         </p:spPr>
         <p:txBody>
-          <a:bodyPr lIns="0" rIns="0" tIns="0" bIns="0"/>
+          <a:bodyPr lIns="0" tIns="0" rIns="0" bIns="0"/>
+          <a:lstStyle/>
           <a:p>
             <a:endParaRPr/>
           </a:p>
@@ -2209,11 +2430,14 @@
       </p:sp>
     </p:spTree>
   </p:cSld>
+  <p:clrMapOvr>
+    <a:masterClrMapping/>
+  </p:clrMapOvr>
 </p:sldLayout>
 </file>
 
 <file path=ppt/slideLayouts/slideLayout9.xml><?xml version="1.0" encoding="utf-8"?>
-<p:sldLayout xmlns:a="http://schemas.openxmlformats.org/drawingml/2006/main" xmlns:p="http://schemas.openxmlformats.org/presentationml/2006/main" xmlns:r="http://schemas.openxmlformats.org/officeDocument/2006/relationships" type="twoObjOverTx" preserve="1">
+<p:sldLayout xmlns:a="http://schemas.openxmlformats.org/drawingml/2006/main" xmlns:r="http://schemas.openxmlformats.org/officeDocument/2006/relationships" xmlns:p="http://schemas.openxmlformats.org/presentationml/2006/main" type="twoObjOverTx" preserve="1">
   <p:cSld name="Title, 2 Content over Content">
     <p:spTree>
       <p:nvGrpSpPr>
@@ -2249,7 +2473,8 @@
           </a:prstGeom>
         </p:spPr>
         <p:txBody>
-          <a:bodyPr lIns="0" rIns="0" tIns="0" bIns="0" anchor="ctr"/>
+          <a:bodyPr lIns="0" tIns="0" rIns="0" bIns="0" anchor="ctr"/>
+          <a:lstStyle/>
           <a:p>
             <a:pPr algn="ctr"/>
             <a:endParaRPr/>
@@ -2276,7 +2501,8 @@
           </a:prstGeom>
         </p:spPr>
         <p:txBody>
-          <a:bodyPr lIns="0" rIns="0" tIns="0" bIns="0"/>
+          <a:bodyPr lIns="0" tIns="0" rIns="0" bIns="0"/>
+          <a:lstStyle/>
           <a:p>
             <a:endParaRPr/>
           </a:p>
@@ -2302,7 +2528,8 @@
           </a:prstGeom>
         </p:spPr>
         <p:txBody>
-          <a:bodyPr lIns="0" rIns="0" tIns="0" bIns="0"/>
+          <a:bodyPr lIns="0" tIns="0" rIns="0" bIns="0"/>
+          <a:lstStyle/>
           <a:p>
             <a:endParaRPr/>
           </a:p>
@@ -2328,7 +2555,8 @@
           </a:prstGeom>
         </p:spPr>
         <p:txBody>
-          <a:bodyPr lIns="0" rIns="0" tIns="0" bIns="0"/>
+          <a:bodyPr lIns="0" tIns="0" rIns="0" bIns="0"/>
+          <a:lstStyle/>
           <a:p>
             <a:endParaRPr/>
           </a:p>
@@ -2336,18 +2564,25 @@
       </p:sp>
     </p:spTree>
   </p:cSld>
+  <p:clrMapOvr>
+    <a:masterClrMapping/>
+  </p:clrMapOvr>
 </p:sldLayout>
 </file>
 
 <file path=ppt/slideMasters/slideMaster1.xml><?xml version="1.0" encoding="utf-8"?>
-<p:sldMaster xmlns:a="http://schemas.openxmlformats.org/drawingml/2006/main" xmlns:p="http://schemas.openxmlformats.org/presentationml/2006/main" xmlns:r="http://schemas.openxmlformats.org/officeDocument/2006/relationships">
+<p:sldMaster xmlns:a="http://schemas.openxmlformats.org/drawingml/2006/main" xmlns:r="http://schemas.openxmlformats.org/officeDocument/2006/relationships" xmlns:p="http://schemas.openxmlformats.org/presentationml/2006/main">
   <p:cSld>
     <p:bg>
       <p:bgPr>
-        <a:blipFill>
-          <a:blip r:embed="rId2"/>
-          <a:tile/>
+        <a:blipFill dpi="0" rotWithShape="1">
+          <a:blip r:embed="rId14">
+            <a:lum/>
+          </a:blip>
+          <a:srcRect/>
+          <a:tile tx="-2540000" ty="-2222500" sx="100000" sy="100000" flip="none" algn="tl"/>
         </a:blipFill>
+        <a:effectLst/>
       </p:bgPr>
     </p:bg>
     <p:spTree>
@@ -2366,7 +2601,7 @@
       </p:grpSpPr>
       <p:sp>
         <p:nvSpPr>
-          <p:cNvPr id="0" name="PlaceHolder 1"/>
+          <p:cNvPr id="2" name="PlaceHolder 1"/>
           <p:cNvSpPr>
             <a:spLocks noGrp="1"/>
           </p:cNvSpPr>
@@ -2384,7 +2619,8 @@
           </a:prstGeom>
         </p:spPr>
         <p:txBody>
-          <a:bodyPr lIns="0" rIns="0" tIns="0" bIns="0" anchor="ctr"/>
+          <a:bodyPr lIns="0" tIns="0" rIns="0" bIns="0" anchor="ctr"/>
+          <a:lstStyle/>
           <a:p>
             <a:pPr algn="ctr"/>
             <a:r>
@@ -2399,7 +2635,7 @@
       </p:sp>
       <p:sp>
         <p:nvSpPr>
-          <p:cNvPr id="1" name="PlaceHolder 2"/>
+          <p:cNvPr id="3" name="PlaceHolder 2"/>
           <p:cNvSpPr>
             <a:spLocks noGrp="1"/>
           </p:cNvSpPr>
@@ -2417,7 +2653,8 @@
           </a:prstGeom>
         </p:spPr>
         <p:txBody>
-          <a:bodyPr lIns="0" rIns="0" tIns="0" bIns="0"/>
+          <a:bodyPr lIns="0" tIns="0" rIns="0" bIns="0"/>
+          <a:lstStyle/>
           <a:p>
             <a:pPr>
               <a:buSzPct val="45000"/>
@@ -2520,33 +2757,42 @@
       </p:sp>
     </p:spTree>
   </p:cSld>
-  <p:clrMap bg1="lt1" bg2="lt2" tx1="dk1" tx2="dk2" accent1="accent1" accent2="accent2" accent3="accent3" accent4="accent4" accent5="accent5" accent6="accent6" hlink="hlink" folHlink="folHlink"/>
+  <p:clrMap bg1="lt1" tx1="dk1" bg2="lt2" tx2="dk2" accent1="accent1" accent2="accent2" accent3="accent3" accent4="accent4" accent5="accent5" accent6="accent6" hlink="hlink" folHlink="folHlink"/>
   <p:sldLayoutIdLst>
-    <p:sldLayoutId id="2147483649" r:id="rId3"/>
-    <p:sldLayoutId id="2147483650" r:id="rId4"/>
-    <p:sldLayoutId id="2147483651" r:id="rId5"/>
-    <p:sldLayoutId id="2147483652" r:id="rId6"/>
-    <p:sldLayoutId id="2147483653" r:id="rId7"/>
-    <p:sldLayoutId id="2147483654" r:id="rId8"/>
-    <p:sldLayoutId id="2147483655" r:id="rId9"/>
-    <p:sldLayoutId id="2147483656" r:id="rId10"/>
-    <p:sldLayoutId id="2147483657" r:id="rId11"/>
-    <p:sldLayoutId id="2147483658" r:id="rId12"/>
-    <p:sldLayoutId id="2147483659" r:id="rId13"/>
-    <p:sldLayoutId id="2147483660" r:id="rId14"/>
+    <p:sldLayoutId id="2147483649" r:id="rId1"/>
+    <p:sldLayoutId id="2147483650" r:id="rId2"/>
+    <p:sldLayoutId id="2147483651" r:id="rId3"/>
+    <p:sldLayoutId id="2147483652" r:id="rId4"/>
+    <p:sldLayoutId id="2147483653" r:id="rId5"/>
+    <p:sldLayoutId id="2147483654" r:id="rId6"/>
+    <p:sldLayoutId id="2147483655" r:id="rId7"/>
+    <p:sldLayoutId id="2147483656" r:id="rId8"/>
+    <p:sldLayoutId id="2147483657" r:id="rId9"/>
+    <p:sldLayoutId id="2147483658" r:id="rId10"/>
+    <p:sldLayoutId id="2147483659" r:id="rId11"/>
+    <p:sldLayoutId id="2147483660" r:id="rId12"/>
   </p:sldLayoutIdLst>
+  <p:txStyles>
+    <p:titleStyle/>
+    <p:bodyStyle/>
+    <p:otherStyle/>
+  </p:txStyles>
 </p:sldMaster>
 </file>
 
 <file path=ppt/slideMasters/slideMaster2.xml><?xml version="1.0" encoding="utf-8"?>
-<p:sldMaster xmlns:a="http://schemas.openxmlformats.org/drawingml/2006/main" xmlns:p="http://schemas.openxmlformats.org/presentationml/2006/main" xmlns:r="http://schemas.openxmlformats.org/officeDocument/2006/relationships">
+<p:sldMaster xmlns:a="http://schemas.openxmlformats.org/drawingml/2006/main" xmlns:r="http://schemas.openxmlformats.org/officeDocument/2006/relationships" xmlns:p="http://schemas.openxmlformats.org/presentationml/2006/main">
   <p:cSld>
     <p:bg>
       <p:bgPr>
-        <a:blipFill>
-          <a:blip r:embed="rId2"/>
-          <a:tile/>
+        <a:blipFill dpi="0" rotWithShape="1">
+          <a:blip r:embed="rId14">
+            <a:lum/>
+          </a:blip>
+          <a:srcRect/>
+          <a:tile tx="-2540000" ty="-2222500" sx="100000" sy="100000" flip="none" algn="tl"/>
         </a:blipFill>
+        <a:effectLst/>
       </p:bgPr>
     </p:bg>
     <p:spTree>
@@ -2583,7 +2829,8 @@
           </a:prstGeom>
         </p:spPr>
         <p:txBody>
-          <a:bodyPr lIns="0" rIns="0" tIns="0" bIns="0" anchor="ctr"/>
+          <a:bodyPr lIns="0" tIns="0" rIns="0" bIns="0" anchor="ctr"/>
+          <a:lstStyle/>
           <a:p>
             <a:pPr algn="ctr"/>
             <a:r>
@@ -2616,7 +2863,8 @@
           </a:prstGeom>
         </p:spPr>
         <p:txBody>
-          <a:bodyPr lIns="0" rIns="0" tIns="0" bIns="0"/>
+          <a:bodyPr lIns="0" tIns="0" rIns="0" bIns="0"/>
+          <a:lstStyle/>
           <a:p>
             <a:pPr>
               <a:buSzPct val="45000"/>
@@ -2719,26 +2967,31 @@
       </p:sp>
     </p:spTree>
   </p:cSld>
-  <p:clrMap bg1="lt1" bg2="lt2" tx1="dk1" tx2="dk2" accent1="accent1" accent2="accent2" accent3="accent3" accent4="accent4" accent5="accent5" accent6="accent6" hlink="hlink" folHlink="folHlink"/>
+  <p:clrMap bg1="lt1" tx1="dk1" bg2="lt2" tx2="dk2" accent1="accent1" accent2="accent2" accent3="accent3" accent4="accent4" accent5="accent5" accent6="accent6" hlink="hlink" folHlink="folHlink"/>
   <p:sldLayoutIdLst>
-    <p:sldLayoutId id="2147483662" r:id="rId3"/>
-    <p:sldLayoutId id="2147483663" r:id="rId4"/>
-    <p:sldLayoutId id="2147483664" r:id="rId5"/>
-    <p:sldLayoutId id="2147483665" r:id="rId6"/>
-    <p:sldLayoutId id="2147483666" r:id="rId7"/>
-    <p:sldLayoutId id="2147483667" r:id="rId8"/>
-    <p:sldLayoutId id="2147483668" r:id="rId9"/>
-    <p:sldLayoutId id="2147483669" r:id="rId10"/>
-    <p:sldLayoutId id="2147483670" r:id="rId11"/>
-    <p:sldLayoutId id="2147483671" r:id="rId12"/>
-    <p:sldLayoutId id="2147483672" r:id="rId13"/>
-    <p:sldLayoutId id="2147483673" r:id="rId14"/>
+    <p:sldLayoutId id="2147483662" r:id="rId1"/>
+    <p:sldLayoutId id="2147483663" r:id="rId2"/>
+    <p:sldLayoutId id="2147483664" r:id="rId3"/>
+    <p:sldLayoutId id="2147483665" r:id="rId4"/>
+    <p:sldLayoutId id="2147483666" r:id="rId5"/>
+    <p:sldLayoutId id="2147483667" r:id="rId6"/>
+    <p:sldLayoutId id="2147483668" r:id="rId7"/>
+    <p:sldLayoutId id="2147483669" r:id="rId8"/>
+    <p:sldLayoutId id="2147483670" r:id="rId9"/>
+    <p:sldLayoutId id="2147483671" r:id="rId10"/>
+    <p:sldLayoutId id="2147483672" r:id="rId11"/>
+    <p:sldLayoutId id="2147483673" r:id="rId12"/>
   </p:sldLayoutIdLst>
+  <p:txStyles>
+    <p:titleStyle/>
+    <p:bodyStyle/>
+    <p:otherStyle/>
+  </p:txStyles>
 </p:sldMaster>
 </file>
 
 <file path=ppt/slides/slide1.xml><?xml version="1.0" encoding="utf-8"?>
-<p:sld xmlns:a="http://schemas.openxmlformats.org/drawingml/2006/main" xmlns:p="http://schemas.openxmlformats.org/presentationml/2006/main" xmlns:r="http://schemas.openxmlformats.org/officeDocument/2006/relationships">
+<p:sld xmlns:a="http://schemas.openxmlformats.org/drawingml/2006/main" xmlns:r="http://schemas.openxmlformats.org/officeDocument/2006/relationships" xmlns:p="http://schemas.openxmlformats.org/presentationml/2006/main">
   <p:cSld>
     <p:spTree>
       <p:nvGrpSpPr>
@@ -2774,7 +3027,8 @@
           </a:ln>
         </p:spPr>
         <p:txBody>
-          <a:bodyPr lIns="90000" rIns="90000" tIns="45000" bIns="45000" anchor="ctr"/>
+          <a:bodyPr lIns="90000" tIns="45000" rIns="90000" bIns="45000" anchor="ctr"/>
+          <a:lstStyle/>
           <a:p>
             <a:endParaRPr/>
           </a:p>
@@ -2806,7 +3060,8 @@
           </a:ln>
         </p:spPr>
         <p:txBody>
-          <a:bodyPr lIns="90000" rIns="90000" tIns="45000" bIns="45000"/>
+          <a:bodyPr lIns="90000" tIns="45000" rIns="90000" bIns="45000"/>
+          <a:lstStyle/>
           <a:p>
             <a:pPr>
               <a:lnSpc>
@@ -2814,15 +3069,24 @@
               </a:lnSpc>
             </a:pPr>
             <a:r>
-              <a:rPr lang="en-US" sz="1600">
-                <a:solidFill>
-                  <a:srgbClr val="000000"/>
-                </a:solidFill>
-                <a:latin typeface="Calibri"/>
-              </a:rPr>
-              <a:t>Rutger van den Berg - 4060156 </a:t>
-            </a:r>
-            <a:endParaRPr/>
+              <a:rPr lang="en-US" sz="1600" dirty="0" err="1">
+                <a:solidFill>
+                  <a:srgbClr val="000000"/>
+                </a:solidFill>
+                <a:latin typeface="Calibri"/>
+              </a:rPr>
+              <a:t>Rutger</a:t>
+            </a:r>
+            <a:r>
+              <a:rPr lang="en-US" sz="1600" dirty="0">
+                <a:solidFill>
+                  <a:srgbClr val="000000"/>
+                </a:solidFill>
+                <a:latin typeface="Calibri"/>
+              </a:rPr>
+              <a:t> van den Berg - 4060156 </a:t>
+            </a:r>
+            <a:endParaRPr dirty="0"/>
           </a:p>
           <a:p>
             <a:pPr>
@@ -2831,15 +3095,42 @@
               </a:lnSpc>
             </a:pPr>
             <a:r>
-              <a:rPr lang="en-US" sz="1600">
-                <a:solidFill>
-                  <a:srgbClr val="000000"/>
-                </a:solidFill>
-                <a:latin typeface="Calibri"/>
-              </a:rPr>
-              <a:t>Ymte Jan Broekhuizen – 4246586</a:t>
-            </a:r>
-            <a:endParaRPr/>
+              <a:rPr lang="en-US" sz="1600" dirty="0" err="1">
+                <a:solidFill>
+                  <a:srgbClr val="000000"/>
+                </a:solidFill>
+                <a:latin typeface="Calibri"/>
+              </a:rPr>
+              <a:t>Ymte</a:t>
+            </a:r>
+            <a:r>
+              <a:rPr lang="en-US" sz="1600" dirty="0">
+                <a:solidFill>
+                  <a:srgbClr val="000000"/>
+                </a:solidFill>
+                <a:latin typeface="Calibri"/>
+              </a:rPr>
+              <a:t> Jan </a:t>
+            </a:r>
+            <a:r>
+              <a:rPr lang="en-US" sz="1600" dirty="0" err="1">
+                <a:solidFill>
+                  <a:srgbClr val="000000"/>
+                </a:solidFill>
+                <a:latin typeface="Calibri"/>
+              </a:rPr>
+              <a:t>Broekhuizen</a:t>
+            </a:r>
+            <a:r>
+              <a:rPr lang="en-US" sz="1600" dirty="0">
+                <a:solidFill>
+                  <a:srgbClr val="000000"/>
+                </a:solidFill>
+                <a:latin typeface="Calibri"/>
+              </a:rPr>
+              <a:t> – 4246586</a:t>
+            </a:r>
+            <a:endParaRPr dirty="0"/>
           </a:p>
           <a:p>
             <a:pPr>
@@ -2848,7 +3139,7 @@
               </a:lnSpc>
             </a:pPr>
             <a:r>
-              <a:rPr lang="en-US" sz="1600">
+              <a:rPr lang="en-US" sz="1600" dirty="0">
                 <a:solidFill>
                   <a:srgbClr val="000000"/>
                 </a:solidFill>
@@ -2856,7 +3147,7 @@
               </a:rPr>
               <a:t>Qu Chen – 1256025</a:t>
             </a:r>
-            <a:endParaRPr/>
+            <a:endParaRPr dirty="0"/>
           </a:p>
           <a:p>
             <a:pPr>
@@ -2865,15 +3156,42 @@
               </a:lnSpc>
             </a:pPr>
             <a:r>
-              <a:rPr lang="en-US" sz="1600">
-                <a:solidFill>
-                  <a:srgbClr val="000000"/>
-                </a:solidFill>
-                <a:latin typeface="Calibri"/>
-              </a:rPr>
-              <a:t>Arend Jan de Graaff – 4012534</a:t>
-            </a:r>
-            <a:endParaRPr/>
+              <a:rPr lang="en-US" sz="1600" dirty="0" err="1">
+                <a:solidFill>
+                  <a:srgbClr val="000000"/>
+                </a:solidFill>
+                <a:latin typeface="Calibri"/>
+              </a:rPr>
+              <a:t>Arend</a:t>
+            </a:r>
+            <a:r>
+              <a:rPr lang="en-US" sz="1600" dirty="0">
+                <a:solidFill>
+                  <a:srgbClr val="000000"/>
+                </a:solidFill>
+                <a:latin typeface="Calibri"/>
+              </a:rPr>
+              <a:t> Jan de </a:t>
+            </a:r>
+            <a:r>
+              <a:rPr lang="en-US" sz="1600" dirty="0" err="1">
+                <a:solidFill>
+                  <a:srgbClr val="000000"/>
+                </a:solidFill>
+                <a:latin typeface="Calibri"/>
+              </a:rPr>
+              <a:t>Graaff</a:t>
+            </a:r>
+            <a:r>
+              <a:rPr lang="en-US" sz="1600" dirty="0">
+                <a:solidFill>
+                  <a:srgbClr val="000000"/>
+                </a:solidFill>
+                <a:latin typeface="Calibri"/>
+              </a:rPr>
+              <a:t> – 4012534</a:t>
+            </a:r>
+            <a:endParaRPr dirty="0"/>
           </a:p>
           <a:p>
             <a:pPr>
@@ -2882,15 +3200,33 @@
               </a:lnSpc>
             </a:pPr>
             <a:r>
-              <a:rPr lang="en-US" sz="1600">
-                <a:solidFill>
-                  <a:srgbClr val="000000"/>
-                </a:solidFill>
-                <a:latin typeface="Calibri"/>
-              </a:rPr>
-              <a:t>Max Groeneboom – 4169298</a:t>
-            </a:r>
-            <a:endParaRPr/>
+              <a:rPr lang="en-US" sz="1600" dirty="0">
+                <a:solidFill>
+                  <a:srgbClr val="000000"/>
+                </a:solidFill>
+                <a:latin typeface="Calibri"/>
+              </a:rPr>
+              <a:t>Max </a:t>
+            </a:r>
+            <a:r>
+              <a:rPr lang="en-US" sz="1600" dirty="0" err="1">
+                <a:solidFill>
+                  <a:srgbClr val="000000"/>
+                </a:solidFill>
+                <a:latin typeface="Calibri"/>
+              </a:rPr>
+              <a:t>Groeneboom</a:t>
+            </a:r>
+            <a:r>
+              <a:rPr lang="en-US" sz="1600" dirty="0">
+                <a:solidFill>
+                  <a:srgbClr val="000000"/>
+                </a:solidFill>
+                <a:latin typeface="Calibri"/>
+              </a:rPr>
+              <a:t> – 4169298</a:t>
+            </a:r>
+            <a:endParaRPr dirty="0"/>
           </a:p>
           <a:p>
             <a:pPr>
@@ -2899,15 +3235,33 @@
               </a:lnSpc>
             </a:pPr>
             <a:r>
-              <a:rPr lang="en-US" sz="1600">
-                <a:solidFill>
-                  <a:srgbClr val="000000"/>
-                </a:solidFill>
-                <a:latin typeface="Calibri"/>
-              </a:rPr>
-              <a:t>Rick van Hattem  - 1297295</a:t>
-            </a:r>
-            <a:endParaRPr/>
+              <a:rPr lang="en-US" sz="1600" dirty="0">
+                <a:solidFill>
+                  <a:srgbClr val="000000"/>
+                </a:solidFill>
+                <a:latin typeface="Calibri"/>
+              </a:rPr>
+              <a:t>Rick van </a:t>
+            </a:r>
+            <a:r>
+              <a:rPr lang="en-US" sz="1600" dirty="0" err="1">
+                <a:solidFill>
+                  <a:srgbClr val="000000"/>
+                </a:solidFill>
+                <a:latin typeface="Calibri"/>
+              </a:rPr>
+              <a:t>Hattem</a:t>
+            </a:r>
+            <a:r>
+              <a:rPr lang="en-US" sz="1600" dirty="0">
+                <a:solidFill>
+                  <a:srgbClr val="000000"/>
+                </a:solidFill>
+                <a:latin typeface="Calibri"/>
+              </a:rPr>
+              <a:t>  - 1297295</a:t>
+            </a:r>
+            <a:endParaRPr dirty="0"/>
           </a:p>
           <a:p>
             <a:pPr>
@@ -2916,15 +3270,42 @@
               </a:lnSpc>
             </a:pPr>
             <a:r>
-              <a:rPr lang="en-US" sz="1600">
-                <a:solidFill>
-                  <a:srgbClr val="000000"/>
-                </a:solidFill>
-                <a:latin typeface="Calibri"/>
-              </a:rPr>
-              <a:t>Ewoud van der Heide – 1534033</a:t>
-            </a:r>
-            <a:endParaRPr/>
+              <a:rPr lang="en-US" sz="1600" dirty="0" err="1">
+                <a:solidFill>
+                  <a:srgbClr val="000000"/>
+                </a:solidFill>
+                <a:latin typeface="Calibri"/>
+              </a:rPr>
+              <a:t>Ewoud</a:t>
+            </a:r>
+            <a:r>
+              <a:rPr lang="en-US" sz="1600" dirty="0">
+                <a:solidFill>
+                  <a:srgbClr val="000000"/>
+                </a:solidFill>
+                <a:latin typeface="Calibri"/>
+              </a:rPr>
+              <a:t> van der </a:t>
+            </a:r>
+            <a:r>
+              <a:rPr lang="en-US" sz="1600" dirty="0" err="1">
+                <a:solidFill>
+                  <a:srgbClr val="000000"/>
+                </a:solidFill>
+                <a:latin typeface="Calibri"/>
+              </a:rPr>
+              <a:t>Heide</a:t>
+            </a:r>
+            <a:r>
+              <a:rPr lang="en-US" sz="1600" dirty="0">
+                <a:solidFill>
+                  <a:srgbClr val="000000"/>
+                </a:solidFill>
+                <a:latin typeface="Calibri"/>
+              </a:rPr>
+              <a:t> – 1534033</a:t>
+            </a:r>
+            <a:endParaRPr dirty="0"/>
           </a:p>
           <a:p>
             <a:pPr>
@@ -2933,15 +3314,33 @@
               </a:lnSpc>
             </a:pPr>
             <a:r>
-              <a:rPr lang="en-US" sz="1600">
-                <a:solidFill>
-                  <a:srgbClr val="000000"/>
-                </a:solidFill>
-                <a:latin typeface="Calibri"/>
-              </a:rPr>
-              <a:t>Leon Hoek – 4021606</a:t>
-            </a:r>
-            <a:endParaRPr/>
+              <a:rPr lang="en-US" sz="1600" dirty="0">
+                <a:solidFill>
+                  <a:srgbClr val="000000"/>
+                </a:solidFill>
+                <a:latin typeface="Calibri"/>
+              </a:rPr>
+              <a:t>Leon </a:t>
+            </a:r>
+            <a:r>
+              <a:rPr lang="en-US" sz="1600" dirty="0" err="1">
+                <a:solidFill>
+                  <a:srgbClr val="000000"/>
+                </a:solidFill>
+                <a:latin typeface="Calibri"/>
+              </a:rPr>
+              <a:t>Hoek</a:t>
+            </a:r>
+            <a:r>
+              <a:rPr lang="en-US" sz="1600" dirty="0">
+                <a:solidFill>
+                  <a:srgbClr val="000000"/>
+                </a:solidFill>
+                <a:latin typeface="Calibri"/>
+              </a:rPr>
+              <a:t> – 4021606</a:t>
+            </a:r>
+            <a:endParaRPr dirty="0"/>
           </a:p>
           <a:p>
             <a:pPr>
@@ -2950,15 +3349,33 @@
               </a:lnSpc>
             </a:pPr>
             <a:r>
-              <a:rPr lang="en-US" sz="1600">
-                <a:solidFill>
-                  <a:srgbClr val="000000"/>
-                </a:solidFill>
-                <a:latin typeface="Calibri"/>
-              </a:rPr>
-              <a:t>Vince Kasanpawiro - 4028880</a:t>
-            </a:r>
-            <a:endParaRPr/>
+              <a:rPr lang="en-US" sz="1600" dirty="0">
+                <a:solidFill>
+                  <a:srgbClr val="000000"/>
+                </a:solidFill>
+                <a:latin typeface="Calibri"/>
+              </a:rPr>
+              <a:t>Vince </a:t>
+            </a:r>
+            <a:r>
+              <a:rPr lang="en-US" sz="1600" dirty="0" err="1">
+                <a:solidFill>
+                  <a:srgbClr val="000000"/>
+                </a:solidFill>
+                <a:latin typeface="Calibri"/>
+              </a:rPr>
+              <a:t>Kasanpawiro</a:t>
+            </a:r>
+            <a:r>
+              <a:rPr lang="en-US" sz="1600" dirty="0">
+                <a:solidFill>
+                  <a:srgbClr val="000000"/>
+                </a:solidFill>
+                <a:latin typeface="Calibri"/>
+              </a:rPr>
+              <a:t> - 4028880</a:t>
+            </a:r>
+            <a:endParaRPr dirty="0"/>
           </a:p>
         </p:txBody>
       </p:sp>
@@ -2982,7 +3399,8 @@
           </a:ln>
         </p:spPr>
         <p:txBody>
-          <a:bodyPr lIns="90000" rIns="90000" tIns="45000" bIns="45000"/>
+          <a:bodyPr lIns="90000" tIns="45000" rIns="90000" bIns="45000"/>
+          <a:lstStyle/>
           <a:p>
             <a:r>
               <a:rPr lang="en-US" sz="5400">
@@ -2996,6 +3414,9 @@
       </p:sp>
     </p:spTree>
   </p:cSld>
+  <p:clrMapOvr>
+    <a:masterClrMapping/>
+  </p:clrMapOvr>
   <p:timing>
     <p:tnLst>
       <p:par>
@@ -3004,14 +3425,14 @@
             <p:seq>
               <p:cTn id="2" nodeType="mainSeq"/>
               <p:prevCondLst>
-                <p:cond delay="0" evt="onPrev">
+                <p:cond evt="onPrev" delay="0">
                   <p:tgtEl>
                     <p:sldTgt/>
                   </p:tgtEl>
                 </p:cond>
               </p:prevCondLst>
               <p:nextCondLst>
-                <p:cond delay="0" evt="onNext">
+                <p:cond evt="onNext" delay="0">
                   <p:tgtEl>
                     <p:sldTgt/>
                   </p:tgtEl>
@@ -3027,7 +3448,7 @@
 </file>
 
 <file path=ppt/slides/slide10.xml><?xml version="1.0" encoding="utf-8"?>
-<p:sld xmlns:a="http://schemas.openxmlformats.org/drawingml/2006/main" xmlns:p="http://schemas.openxmlformats.org/presentationml/2006/main" xmlns:r="http://schemas.openxmlformats.org/officeDocument/2006/relationships">
+<p:sld xmlns:a="http://schemas.openxmlformats.org/drawingml/2006/main" xmlns:r="http://schemas.openxmlformats.org/officeDocument/2006/relationships" xmlns:p="http://schemas.openxmlformats.org/presentationml/2006/main">
   <p:cSld>
     <p:spTree>
       <p:nvGrpSpPr>
@@ -3063,7 +3484,8 @@
           </a:ln>
         </p:spPr>
         <p:txBody>
-          <a:bodyPr lIns="90000" rIns="90000" tIns="45000" bIns="45000" anchor="ctr"/>
+          <a:bodyPr lIns="90000" tIns="45000" rIns="90000" bIns="45000" anchor="ctr"/>
+          <a:lstStyle/>
           <a:p>
             <a:r>
               <a:rPr lang="en-US" sz="4400">
@@ -3077,12 +3499,12 @@
       </p:sp>
       <p:pic>
         <p:nvPicPr>
-          <p:cNvPr id="94" name="" descr=""/>
+          <p:cNvPr id="94" name="Afbeelding 93"/>
           <p:cNvPicPr/>
           <p:nvPr/>
         </p:nvPicPr>
         <p:blipFill>
-          <a:blip r:embed="rId1"/>
+          <a:blip r:embed="rId2"/>
           <a:stretch>
             <a:fillRect/>
           </a:stretch>
@@ -3102,22 +3524,25 @@
       </p:pic>
     </p:spTree>
   </p:cSld>
+  <p:clrMapOvr>
+    <a:masterClrMapping/>
+  </p:clrMapOvr>
   <p:timing>
     <p:tnLst>
       <p:par>
-        <p:cTn id="19" dur="indefinite" restart="never" nodeType="tmRoot">
+        <p:cTn id="1" dur="indefinite" restart="never" nodeType="tmRoot">
           <p:childTnLst>
             <p:seq>
-              <p:cTn id="20" nodeType="mainSeq"/>
+              <p:cTn id="2" nodeType="mainSeq"/>
               <p:prevCondLst>
-                <p:cond delay="0" evt="onPrev">
+                <p:cond evt="onPrev" delay="0">
                   <p:tgtEl>
                     <p:sldTgt/>
                   </p:tgtEl>
                 </p:cond>
               </p:prevCondLst>
               <p:nextCondLst>
-                <p:cond delay="0" evt="onNext">
+                <p:cond evt="onNext" delay="0">
                   <p:tgtEl>
                     <p:sldTgt/>
                   </p:tgtEl>
@@ -3133,7 +3558,7 @@
 </file>
 
 <file path=ppt/slides/slide11.xml><?xml version="1.0" encoding="utf-8"?>
-<p:sld xmlns:a="http://schemas.openxmlformats.org/drawingml/2006/main" xmlns:p="http://schemas.openxmlformats.org/presentationml/2006/main" xmlns:r="http://schemas.openxmlformats.org/officeDocument/2006/relationships">
+<p:sld xmlns:a="http://schemas.openxmlformats.org/drawingml/2006/main" xmlns:r="http://schemas.openxmlformats.org/officeDocument/2006/relationships" xmlns:p="http://schemas.openxmlformats.org/presentationml/2006/main">
   <p:cSld>
     <p:spTree>
       <p:nvGrpSpPr>
@@ -3151,12 +3576,12 @@
       </p:grpSpPr>
       <p:pic>
         <p:nvPicPr>
-          <p:cNvPr id="95" name="" descr=""/>
+          <p:cNvPr id="95" name="Afbeelding 94"/>
           <p:cNvPicPr/>
           <p:nvPr/>
         </p:nvPicPr>
         <p:blipFill>
-          <a:blip r:embed="rId1"/>
+          <a:blip r:embed="rId2"/>
           <a:stretch>
             <a:fillRect/>
           </a:stretch>
@@ -3194,7 +3619,8 @@
           </a:ln>
         </p:spPr>
         <p:txBody>
-          <a:bodyPr lIns="90000" rIns="90000" tIns="45000" bIns="45000" anchor="ctr"/>
+          <a:bodyPr lIns="90000" tIns="45000" rIns="90000" bIns="45000" anchor="ctr"/>
+          <a:lstStyle/>
           <a:p>
             <a:r>
               <a:rPr lang="en-US" sz="4400">
@@ -3208,22 +3634,25 @@
       </p:sp>
     </p:spTree>
   </p:cSld>
+  <p:clrMapOvr>
+    <a:masterClrMapping/>
+  </p:clrMapOvr>
   <p:timing>
     <p:tnLst>
       <p:par>
-        <p:cTn id="21" dur="indefinite" restart="never" nodeType="tmRoot">
+        <p:cTn id="1" dur="indefinite" restart="never" nodeType="tmRoot">
           <p:childTnLst>
             <p:seq>
-              <p:cTn id="22" nodeType="mainSeq"/>
+              <p:cTn id="2" nodeType="mainSeq"/>
               <p:prevCondLst>
-                <p:cond delay="0" evt="onPrev">
+                <p:cond evt="onPrev" delay="0">
                   <p:tgtEl>
                     <p:sldTgt/>
                   </p:tgtEl>
                 </p:cond>
               </p:prevCondLst>
               <p:nextCondLst>
-                <p:cond delay="0" evt="onNext">
+                <p:cond evt="onNext" delay="0">
                   <p:tgtEl>
                     <p:sldTgt/>
                   </p:tgtEl>
@@ -3239,7 +3668,7 @@
 </file>
 
 <file path=ppt/slides/slide2.xml><?xml version="1.0" encoding="utf-8"?>
-<p:sld xmlns:a="http://schemas.openxmlformats.org/drawingml/2006/main" xmlns:p="http://schemas.openxmlformats.org/presentationml/2006/main" xmlns:r="http://schemas.openxmlformats.org/officeDocument/2006/relationships">
+<p:sld xmlns:a="http://schemas.openxmlformats.org/drawingml/2006/main" xmlns:r="http://schemas.openxmlformats.org/officeDocument/2006/relationships" xmlns:p="http://schemas.openxmlformats.org/presentationml/2006/main">
   <p:cSld>
     <p:spTree>
       <p:nvGrpSpPr>
@@ -3275,7 +3704,8 @@
           </a:ln>
         </p:spPr>
         <p:txBody>
-          <a:bodyPr lIns="90000" rIns="90000" tIns="45000" bIns="45000" anchor="ctr"/>
+          <a:bodyPr lIns="90000" tIns="45000" rIns="90000" bIns="45000" anchor="ctr"/>
+          <a:lstStyle/>
           <a:p>
             <a:pPr algn="ctr">
               <a:lnSpc>
@@ -3315,7 +3745,8 @@
           </a:ln>
         </p:spPr>
         <p:txBody>
-          <a:bodyPr lIns="90000" rIns="90000" tIns="45000" bIns="45000"/>
+          <a:bodyPr lIns="90000" tIns="45000" rIns="90000" bIns="45000"/>
+          <a:lstStyle/>
           <a:p>
             <a:pPr>
               <a:lnSpc>
@@ -3339,22 +3770,25 @@
       </p:sp>
     </p:spTree>
   </p:cSld>
+  <p:clrMapOvr>
+    <a:masterClrMapping/>
+  </p:clrMapOvr>
   <p:timing>
     <p:tnLst>
       <p:par>
-        <p:cTn id="3" dur="indefinite" restart="never" nodeType="tmRoot">
+        <p:cTn id="1" dur="indefinite" restart="never" nodeType="tmRoot">
           <p:childTnLst>
             <p:seq>
-              <p:cTn id="4" nodeType="mainSeq"/>
+              <p:cTn id="2" nodeType="mainSeq"/>
               <p:prevCondLst>
-                <p:cond delay="0" evt="onPrev">
+                <p:cond evt="onPrev" delay="0">
                   <p:tgtEl>
                     <p:sldTgt/>
                   </p:tgtEl>
                 </p:cond>
               </p:prevCondLst>
               <p:nextCondLst>
-                <p:cond delay="0" evt="onNext">
+                <p:cond evt="onNext" delay="0">
                   <p:tgtEl>
                     <p:sldTgt/>
                   </p:tgtEl>
@@ -3370,7 +3804,7 @@
 </file>
 
 <file path=ppt/slides/slide3.xml><?xml version="1.0" encoding="utf-8"?>
-<p:sld xmlns:a="http://schemas.openxmlformats.org/drawingml/2006/main" xmlns:p="http://schemas.openxmlformats.org/presentationml/2006/main" xmlns:r="http://schemas.openxmlformats.org/officeDocument/2006/relationships">
+<p:sld xmlns:a="http://schemas.openxmlformats.org/drawingml/2006/main" xmlns:r="http://schemas.openxmlformats.org/officeDocument/2006/relationships" xmlns:p="http://schemas.openxmlformats.org/presentationml/2006/main">
   <p:cSld>
     <p:spTree>
       <p:nvGrpSpPr>
@@ -3406,7 +3840,8 @@
           </a:ln>
         </p:spPr>
         <p:txBody>
-          <a:bodyPr lIns="90000" rIns="90000" tIns="45000" bIns="45000" anchor="ctr"/>
+          <a:bodyPr lIns="90000" tIns="45000" rIns="90000" bIns="45000" anchor="ctr"/>
+          <a:lstStyle/>
           <a:p>
             <a:pPr algn="ctr">
               <a:lnSpc>
@@ -3446,7 +3881,8 @@
           </a:ln>
         </p:spPr>
         <p:txBody>
-          <a:bodyPr lIns="90000" rIns="90000" tIns="45000" bIns="45000"/>
+          <a:bodyPr lIns="90000" tIns="45000" rIns="90000" bIns="45000"/>
+          <a:lstStyle/>
           <a:p>
             <a:pPr>
               <a:lnSpc>
@@ -3454,15 +3890,24 @@
               </a:lnSpc>
             </a:pPr>
             <a:r>
-              <a:rPr lang="en-US">
-                <a:solidFill>
-                  <a:srgbClr val="000000"/>
-                </a:solidFill>
-                <a:latin typeface="Calibri"/>
-              </a:rPr>
-              <a:t>Rutger: Debugging Linux, reflection, made sphere model</a:t>
-            </a:r>
-            <a:endParaRPr/>
+              <a:rPr lang="en-US" dirty="0" err="1">
+                <a:solidFill>
+                  <a:srgbClr val="000000"/>
+                </a:solidFill>
+                <a:latin typeface="Calibri"/>
+              </a:rPr>
+              <a:t>Rutger</a:t>
+            </a:r>
+            <a:r>
+              <a:rPr lang="en-US" dirty="0">
+                <a:solidFill>
+                  <a:srgbClr val="000000"/>
+                </a:solidFill>
+                <a:latin typeface="Calibri"/>
+              </a:rPr>
+              <a:t>: Debugging Linux, reflection, made sphere model</a:t>
+            </a:r>
+            <a:endParaRPr dirty="0"/>
           </a:p>
           <a:p>
             <a:pPr>
@@ -3471,15 +3916,105 @@
               </a:lnSpc>
             </a:pPr>
             <a:r>
-              <a:rPr lang="en-US">
-                <a:solidFill>
-                  <a:srgbClr val="000000"/>
-                </a:solidFill>
-                <a:latin typeface="Calibri"/>
-              </a:rPr>
-              <a:t>Ymte Jan: Octree,  multithreading, old RealTime RayTracing, shadows, added movement of model through WASDEQ keys, added ground textures, Phong shaders</a:t>
-            </a:r>
-            <a:endParaRPr/>
+              <a:rPr lang="en-US" dirty="0" err="1">
+                <a:solidFill>
+                  <a:srgbClr val="000000"/>
+                </a:solidFill>
+                <a:latin typeface="Calibri"/>
+              </a:rPr>
+              <a:t>Ymte</a:t>
+            </a:r>
+            <a:r>
+              <a:rPr lang="en-US" dirty="0">
+                <a:solidFill>
+                  <a:srgbClr val="000000"/>
+                </a:solidFill>
+                <a:latin typeface="Calibri"/>
+              </a:rPr>
+              <a:t> Jan: </a:t>
+            </a:r>
+            <a:r>
+              <a:rPr lang="en-US" dirty="0" err="1">
+                <a:solidFill>
+                  <a:srgbClr val="000000"/>
+                </a:solidFill>
+                <a:latin typeface="Calibri"/>
+              </a:rPr>
+              <a:t>Octree</a:t>
+            </a:r>
+            <a:r>
+              <a:rPr lang="en-US" dirty="0">
+                <a:solidFill>
+                  <a:srgbClr val="000000"/>
+                </a:solidFill>
+                <a:latin typeface="Calibri"/>
+              </a:rPr>
+              <a:t>,  multithreading, old </a:t>
+            </a:r>
+            <a:r>
+              <a:rPr lang="en-US" dirty="0" err="1">
+                <a:solidFill>
+                  <a:srgbClr val="000000"/>
+                </a:solidFill>
+                <a:latin typeface="Calibri"/>
+              </a:rPr>
+              <a:t>RealTime</a:t>
+            </a:r>
+            <a:r>
+              <a:rPr lang="en-US" dirty="0">
+                <a:solidFill>
+                  <a:srgbClr val="000000"/>
+                </a:solidFill>
+                <a:latin typeface="Calibri"/>
+              </a:rPr>
+              <a:t> </a:t>
+            </a:r>
+            <a:r>
+              <a:rPr lang="en-US" dirty="0" err="1">
+                <a:solidFill>
+                  <a:srgbClr val="000000"/>
+                </a:solidFill>
+                <a:latin typeface="Calibri"/>
+              </a:rPr>
+              <a:t>RayTracing</a:t>
+            </a:r>
+            <a:r>
+              <a:rPr lang="en-US" dirty="0">
+                <a:solidFill>
+                  <a:srgbClr val="000000"/>
+                </a:solidFill>
+                <a:latin typeface="Calibri"/>
+              </a:rPr>
+              <a:t>, shadows, added movement of model through WASDEQ keys, added ground textures, </a:t>
+            </a:r>
+            <a:r>
+              <a:rPr lang="en-US" dirty="0" err="1">
+                <a:solidFill>
+                  <a:srgbClr val="000000"/>
+                </a:solidFill>
+                <a:latin typeface="Calibri"/>
+              </a:rPr>
+              <a:t>Phong</a:t>
+            </a:r>
+            <a:r>
+              <a:rPr lang="en-US" dirty="0">
+                <a:solidFill>
+                  <a:srgbClr val="000000"/>
+                </a:solidFill>
+                <a:latin typeface="Calibri"/>
+              </a:rPr>
+              <a:t> </a:t>
+            </a:r>
+            <a:r>
+              <a:rPr lang="en-US" dirty="0" err="1">
+                <a:solidFill>
+                  <a:srgbClr val="000000"/>
+                </a:solidFill>
+                <a:latin typeface="Calibri"/>
+              </a:rPr>
+              <a:t>shaders</a:t>
+            </a:r>
+            <a:endParaRPr dirty="0"/>
           </a:p>
           <a:p>
             <a:pPr>
@@ -3488,7 +4023,7 @@
               </a:lnSpc>
             </a:pPr>
             <a:r>
-              <a:rPr lang="en-US">
+              <a:rPr lang="en-US" dirty="0">
                 <a:solidFill>
                   <a:srgbClr val="000000"/>
                 </a:solidFill>
@@ -3496,7 +4031,7 @@
               </a:rPr>
               <a:t>Qu: Debugging Visual Studio, Ray-Sphere Intersection, made slides</a:t>
             </a:r>
-            <a:endParaRPr/>
+            <a:endParaRPr dirty="0"/>
           </a:p>
           <a:p>
             <a:pPr>
@@ -3505,15 +4040,42 @@
               </a:lnSpc>
             </a:pPr>
             <a:r>
-              <a:rPr lang="en-US">
-                <a:solidFill>
-                  <a:srgbClr val="000000"/>
-                </a:solidFill>
-                <a:latin typeface="Calibri"/>
-              </a:rPr>
-              <a:t>Arend Jan: Debugging Visual Studio, made a branch, and removed a line</a:t>
-            </a:r>
-            <a:endParaRPr/>
+              <a:rPr lang="en-US" dirty="0" err="1">
+                <a:solidFill>
+                  <a:srgbClr val="000000"/>
+                </a:solidFill>
+                <a:latin typeface="Calibri"/>
+              </a:rPr>
+              <a:t>Arend</a:t>
+            </a:r>
+            <a:r>
+              <a:rPr lang="en-US" dirty="0">
+                <a:solidFill>
+                  <a:srgbClr val="000000"/>
+                </a:solidFill>
+                <a:latin typeface="Calibri"/>
+              </a:rPr>
+              <a:t> Jan: Debugging Visual Studio, made a branch, </a:t>
+            </a:r>
+            <a:r>
+              <a:rPr lang="nl-NL" dirty="0" err="1" smtClean="0">
+                <a:solidFill>
+                  <a:srgbClr val="000000"/>
+                </a:solidFill>
+                <a:latin typeface="Calibri"/>
+              </a:rPr>
+              <a:t>updated</a:t>
+            </a:r>
+            <a:r>
+              <a:rPr lang="nl-NL" smtClean="0">
+                <a:solidFill>
+                  <a:srgbClr val="000000"/>
+                </a:solidFill>
+                <a:latin typeface="Calibri"/>
+              </a:rPr>
+              <a:t> slides</a:t>
+            </a:r>
+            <a:endParaRPr dirty="0"/>
           </a:p>
           <a:p>
             <a:pPr>
@@ -3522,15 +4084,51 @@
               </a:lnSpc>
             </a:pPr>
             <a:r>
-              <a:rPr lang="en-US">
-                <a:solidFill>
-                  <a:srgbClr val="000000"/>
-                </a:solidFill>
-                <a:latin typeface="Calibri"/>
-              </a:rPr>
-              <a:t>Max: Ray-Sphere Intersection, Ray-Triangle Intersection,  debugging Visual Studio, made Sierpinski Pyramid model, made UglyThing model, made cube model, shadows, old FPS counter</a:t>
-            </a:r>
-            <a:endParaRPr/>
+              <a:rPr lang="en-US" dirty="0">
+                <a:solidFill>
+                  <a:srgbClr val="000000"/>
+                </a:solidFill>
+                <a:latin typeface="Calibri"/>
+              </a:rPr>
+              <a:t>Max: Ray-Sphere Intersection, Ray-Triangle Intersection,  debugging Visual Studio, made </a:t>
+            </a:r>
+            <a:r>
+              <a:rPr lang="en-US" dirty="0" err="1">
+                <a:solidFill>
+                  <a:srgbClr val="000000"/>
+                </a:solidFill>
+                <a:latin typeface="Calibri"/>
+              </a:rPr>
+              <a:t>Sierpinski</a:t>
+            </a:r>
+            <a:r>
+              <a:rPr lang="en-US" dirty="0">
+                <a:solidFill>
+                  <a:srgbClr val="000000"/>
+                </a:solidFill>
+                <a:latin typeface="Calibri"/>
+              </a:rPr>
+              <a:t> Pyramid model, made </a:t>
+            </a:r>
+            <a:r>
+              <a:rPr lang="en-US" dirty="0" err="1">
+                <a:solidFill>
+                  <a:srgbClr val="000000"/>
+                </a:solidFill>
+                <a:latin typeface="Calibri"/>
+              </a:rPr>
+              <a:t>UglyThing</a:t>
+            </a:r>
+            <a:r>
+              <a:rPr lang="en-US" dirty="0">
+                <a:solidFill>
+                  <a:srgbClr val="000000"/>
+                </a:solidFill>
+                <a:latin typeface="Calibri"/>
+              </a:rPr>
+              <a:t> model, made cube model, shadows, old FPS counter</a:t>
+            </a:r>
+            <a:endParaRPr dirty="0"/>
           </a:p>
           <a:p>
             <a:pPr>
@@ -3539,15 +4137,114 @@
               </a:lnSpc>
             </a:pPr>
             <a:r>
-              <a:rPr lang="en-US">
-                <a:solidFill>
-                  <a:srgbClr val="000000"/>
-                </a:solidFill>
-                <a:latin typeface="Calibri"/>
-              </a:rPr>
-              <a:t>Rick: Multithreading, downloaded simplemonkey model, debugging McOS, hosted git, timer, rewriting galore, background raytracing, , current FPS counter, current RealTime RayTracing</a:t>
-            </a:r>
-            <a:endParaRPr/>
+              <a:rPr lang="en-US" dirty="0">
+                <a:solidFill>
+                  <a:srgbClr val="000000"/>
+                </a:solidFill>
+                <a:latin typeface="Calibri"/>
+              </a:rPr>
+              <a:t>Rick: Multithreading, downloaded </a:t>
+            </a:r>
+            <a:r>
+              <a:rPr lang="en-US" dirty="0" err="1">
+                <a:solidFill>
+                  <a:srgbClr val="000000"/>
+                </a:solidFill>
+                <a:latin typeface="Calibri"/>
+              </a:rPr>
+              <a:t>simplemonkey</a:t>
+            </a:r>
+            <a:r>
+              <a:rPr lang="en-US" dirty="0">
+                <a:solidFill>
+                  <a:srgbClr val="000000"/>
+                </a:solidFill>
+                <a:latin typeface="Calibri"/>
+              </a:rPr>
+              <a:t> model, debugging </a:t>
+            </a:r>
+            <a:r>
+              <a:rPr lang="en-US" dirty="0" err="1">
+                <a:solidFill>
+                  <a:srgbClr val="000000"/>
+                </a:solidFill>
+                <a:latin typeface="Calibri"/>
+              </a:rPr>
+              <a:t>McOS</a:t>
+            </a:r>
+            <a:r>
+              <a:rPr lang="en-US" dirty="0">
+                <a:solidFill>
+                  <a:srgbClr val="000000"/>
+                </a:solidFill>
+                <a:latin typeface="Calibri"/>
+              </a:rPr>
+              <a:t>, hosted </a:t>
+            </a:r>
+            <a:r>
+              <a:rPr lang="en-US" dirty="0" err="1">
+                <a:solidFill>
+                  <a:srgbClr val="000000"/>
+                </a:solidFill>
+                <a:latin typeface="Calibri"/>
+              </a:rPr>
+              <a:t>git</a:t>
+            </a:r>
+            <a:r>
+              <a:rPr lang="en-US" dirty="0">
+                <a:solidFill>
+                  <a:srgbClr val="000000"/>
+                </a:solidFill>
+                <a:latin typeface="Calibri"/>
+              </a:rPr>
+              <a:t>, timer, rewriting galore, background </a:t>
+            </a:r>
+            <a:r>
+              <a:rPr lang="en-US" dirty="0" err="1">
+                <a:solidFill>
+                  <a:srgbClr val="000000"/>
+                </a:solidFill>
+                <a:latin typeface="Calibri"/>
+              </a:rPr>
+              <a:t>raytracing</a:t>
+            </a:r>
+            <a:r>
+              <a:rPr lang="en-US" dirty="0">
+                <a:solidFill>
+                  <a:srgbClr val="000000"/>
+                </a:solidFill>
+                <a:latin typeface="Calibri"/>
+              </a:rPr>
+              <a:t>, , current FPS counter, current </a:t>
+            </a:r>
+            <a:r>
+              <a:rPr lang="en-US" dirty="0" err="1">
+                <a:solidFill>
+                  <a:srgbClr val="000000"/>
+                </a:solidFill>
+                <a:latin typeface="Calibri"/>
+              </a:rPr>
+              <a:t>RealTime</a:t>
+            </a:r>
+            <a:r>
+              <a:rPr lang="en-US" dirty="0">
+                <a:solidFill>
+                  <a:srgbClr val="000000"/>
+                </a:solidFill>
+                <a:latin typeface="Calibri"/>
+              </a:rPr>
+              <a:t> </a:t>
+            </a:r>
+            <a:r>
+              <a:rPr lang="en-US" dirty="0" err="1">
+                <a:solidFill>
+                  <a:srgbClr val="000000"/>
+                </a:solidFill>
+                <a:latin typeface="Calibri"/>
+              </a:rPr>
+              <a:t>RayTracing</a:t>
+            </a:r>
+            <a:endParaRPr dirty="0"/>
           </a:p>
           <a:p>
             <a:pPr>
@@ -3556,15 +4253,42 @@
               </a:lnSpc>
             </a:pPr>
             <a:r>
-              <a:rPr lang="en-US">
-                <a:solidFill>
-                  <a:srgbClr val="000000"/>
-                </a:solidFill>
-                <a:latin typeface="Calibri"/>
-              </a:rPr>
-              <a:t>Ewoud: Colours, made beer bottle model</a:t>
-            </a:r>
-            <a:endParaRPr/>
+              <a:rPr lang="en-US" dirty="0" err="1">
+                <a:solidFill>
+                  <a:srgbClr val="000000"/>
+                </a:solidFill>
+                <a:latin typeface="Calibri"/>
+              </a:rPr>
+              <a:t>Ewoud</a:t>
+            </a:r>
+            <a:r>
+              <a:rPr lang="en-US" dirty="0">
+                <a:solidFill>
+                  <a:srgbClr val="000000"/>
+                </a:solidFill>
+                <a:latin typeface="Calibri"/>
+              </a:rPr>
+              <a:t>: </a:t>
+            </a:r>
+            <a:r>
+              <a:rPr lang="en-US" dirty="0" err="1">
+                <a:solidFill>
+                  <a:srgbClr val="000000"/>
+                </a:solidFill>
+                <a:latin typeface="Calibri"/>
+              </a:rPr>
+              <a:t>Colours</a:t>
+            </a:r>
+            <a:r>
+              <a:rPr lang="en-US" dirty="0">
+                <a:solidFill>
+                  <a:srgbClr val="000000"/>
+                </a:solidFill>
+                <a:latin typeface="Calibri"/>
+              </a:rPr>
+              <a:t>, made beer bottle model</a:t>
+            </a:r>
+            <a:endParaRPr dirty="0"/>
           </a:p>
           <a:p>
             <a:pPr>
@@ -3573,15 +4297,42 @@
               </a:lnSpc>
             </a:pPr>
             <a:r>
-              <a:rPr lang="en-US">
-                <a:solidFill>
-                  <a:srgbClr val="000000"/>
-                </a:solidFill>
-                <a:latin typeface="Calibri"/>
-              </a:rPr>
-              <a:t>Leon: Octree, debugging Linux</a:t>
-            </a:r>
-            <a:endParaRPr/>
+              <a:rPr lang="en-US" dirty="0">
+                <a:solidFill>
+                  <a:srgbClr val="000000"/>
+                </a:solidFill>
+                <a:latin typeface="Calibri"/>
+              </a:rPr>
+              <a:t>Leon: </a:t>
+            </a:r>
+            <a:r>
+              <a:rPr lang="en-US" dirty="0" err="1">
+                <a:solidFill>
+                  <a:srgbClr val="000000"/>
+                </a:solidFill>
+                <a:latin typeface="Calibri"/>
+              </a:rPr>
+              <a:t>Octree</a:t>
+            </a:r>
+            <a:r>
+              <a:rPr lang="en-US" dirty="0">
+                <a:solidFill>
+                  <a:srgbClr val="000000"/>
+                </a:solidFill>
+                <a:latin typeface="Calibri"/>
+              </a:rPr>
+              <a:t>, debugging </a:t>
+            </a:r>
+            <a:r>
+              <a:rPr lang="en-US" dirty="0" smtClean="0">
+                <a:solidFill>
+                  <a:srgbClr val="000000"/>
+                </a:solidFill>
+                <a:latin typeface="Calibri"/>
+              </a:rPr>
+              <a:t>Linux, made football model</a:t>
+            </a:r>
+            <a:endParaRPr dirty="0"/>
           </a:p>
           <a:p>
             <a:pPr>
@@ -3590,7 +4341,7 @@
               </a:lnSpc>
             </a:pPr>
             <a:r>
-              <a:rPr lang="en-US">
+              <a:rPr lang="en-US" dirty="0">
                 <a:solidFill>
                   <a:srgbClr val="000000"/>
                 </a:solidFill>
@@ -3598,28 +4349,31 @@
               </a:rPr>
               <a:t>Vince: Made Diamond model, made slides, debugging Visual Studio</a:t>
             </a:r>
-            <a:endParaRPr/>
+            <a:endParaRPr dirty="0"/>
           </a:p>
         </p:txBody>
       </p:sp>
     </p:spTree>
   </p:cSld>
+  <p:clrMapOvr>
+    <a:masterClrMapping/>
+  </p:clrMapOvr>
   <p:timing>
     <p:tnLst>
       <p:par>
-        <p:cTn id="5" dur="indefinite" restart="never" nodeType="tmRoot">
+        <p:cTn id="1" dur="indefinite" restart="never" nodeType="tmRoot">
           <p:childTnLst>
             <p:seq>
-              <p:cTn id="6" nodeType="mainSeq"/>
+              <p:cTn id="2" nodeType="mainSeq"/>
               <p:prevCondLst>
-                <p:cond delay="0" evt="onPrev">
+                <p:cond evt="onPrev" delay="0">
                   <p:tgtEl>
                     <p:sldTgt/>
                   </p:tgtEl>
                 </p:cond>
               </p:prevCondLst>
               <p:nextCondLst>
-                <p:cond delay="0" evt="onNext">
+                <p:cond evt="onNext" delay="0">
                   <p:tgtEl>
                     <p:sldTgt/>
                   </p:tgtEl>
@@ -3635,7 +4389,7 @@
 </file>
 
 <file path=ppt/slides/slide4.xml><?xml version="1.0" encoding="utf-8"?>
-<p:sld xmlns:a="http://schemas.openxmlformats.org/drawingml/2006/main" xmlns:p="http://schemas.openxmlformats.org/presentationml/2006/main" xmlns:r="http://schemas.openxmlformats.org/officeDocument/2006/relationships">
+<p:sld xmlns:a="http://schemas.openxmlformats.org/drawingml/2006/main" xmlns:r="http://schemas.openxmlformats.org/officeDocument/2006/relationships" xmlns:p="http://schemas.openxmlformats.org/presentationml/2006/main">
   <p:cSld>
     <p:spTree>
       <p:nvGrpSpPr>
@@ -3671,7 +4425,8 @@
           </a:ln>
         </p:spPr>
         <p:txBody>
-          <a:bodyPr lIns="90000" rIns="90000" tIns="45000" bIns="45000" anchor="ctr"/>
+          <a:bodyPr lIns="90000" tIns="45000" rIns="90000" bIns="45000" anchor="ctr"/>
+          <a:lstStyle/>
           <a:p>
             <a:pPr algn="ctr">
               <a:lnSpc>
@@ -3693,12 +4448,12 @@
       </p:sp>
       <p:pic>
         <p:nvPicPr>
-          <p:cNvPr id="80" name="Content Placeholder 3" descr=""/>
+          <p:cNvPr id="80" name="Content Placeholder 3"/>
           <p:cNvPicPr/>
           <p:nvPr/>
         </p:nvPicPr>
         <p:blipFill>
-          <a:blip r:embed="rId1"/>
+          <a:blip r:embed="rId2"/>
           <a:stretch>
             <a:fillRect/>
           </a:stretch>
@@ -3718,22 +4473,25 @@
       </p:pic>
     </p:spTree>
   </p:cSld>
+  <p:clrMapOvr>
+    <a:masterClrMapping/>
+  </p:clrMapOvr>
   <p:timing>
     <p:tnLst>
       <p:par>
-        <p:cTn id="7" dur="indefinite" restart="never" nodeType="tmRoot">
+        <p:cTn id="1" dur="indefinite" restart="never" nodeType="tmRoot">
           <p:childTnLst>
             <p:seq>
-              <p:cTn id="8" nodeType="mainSeq"/>
+              <p:cTn id="2" nodeType="mainSeq"/>
               <p:prevCondLst>
-                <p:cond delay="0" evt="onPrev">
+                <p:cond evt="onPrev" delay="0">
                   <p:tgtEl>
                     <p:sldTgt/>
                   </p:tgtEl>
                 </p:cond>
               </p:prevCondLst>
               <p:nextCondLst>
-                <p:cond delay="0" evt="onNext">
+                <p:cond evt="onNext" delay="0">
                   <p:tgtEl>
                     <p:sldTgt/>
                   </p:tgtEl>
@@ -3749,7 +4507,7 @@
 </file>
 
 <file path=ppt/slides/slide5.xml><?xml version="1.0" encoding="utf-8"?>
-<p:sld xmlns:a="http://schemas.openxmlformats.org/drawingml/2006/main" xmlns:p="http://schemas.openxmlformats.org/presentationml/2006/main" xmlns:r="http://schemas.openxmlformats.org/officeDocument/2006/relationships">
+<p:sld xmlns:a="http://schemas.openxmlformats.org/drawingml/2006/main" xmlns:r="http://schemas.openxmlformats.org/officeDocument/2006/relationships" xmlns:p="http://schemas.openxmlformats.org/presentationml/2006/main">
   <p:cSld>
     <p:spTree>
       <p:nvGrpSpPr>
@@ -3785,7 +4543,8 @@
           </a:ln>
         </p:spPr>
         <p:txBody>
-          <a:bodyPr lIns="90000" rIns="90000" tIns="45000" bIns="45000" anchor="ctr"/>
+          <a:bodyPr lIns="90000" tIns="45000" rIns="90000" bIns="45000" anchor="ctr"/>
+          <a:lstStyle/>
           <a:p>
             <a:pPr algn="ctr">
               <a:lnSpc>
@@ -3827,12 +4586,12 @@
       </p:sp>
       <p:pic>
         <p:nvPicPr>
-          <p:cNvPr id="83" name="Picture 2" descr=""/>
+          <p:cNvPr id="83" name="Picture 2"/>
           <p:cNvPicPr/>
           <p:nvPr/>
         </p:nvPicPr>
         <p:blipFill>
-          <a:blip r:embed="rId1"/>
+          <a:blip r:embed="rId2"/>
           <a:stretch>
             <a:fillRect/>
           </a:stretch>
@@ -3852,22 +4611,25 @@
       </p:pic>
     </p:spTree>
   </p:cSld>
+  <p:clrMapOvr>
+    <a:masterClrMapping/>
+  </p:clrMapOvr>
   <p:timing>
     <p:tnLst>
       <p:par>
-        <p:cTn id="9" dur="indefinite" restart="never" nodeType="tmRoot">
+        <p:cTn id="1" dur="indefinite" restart="never" nodeType="tmRoot">
           <p:childTnLst>
             <p:seq>
-              <p:cTn id="10" nodeType="mainSeq"/>
+              <p:cTn id="2" nodeType="mainSeq"/>
               <p:prevCondLst>
-                <p:cond delay="0" evt="onPrev">
+                <p:cond evt="onPrev" delay="0">
                   <p:tgtEl>
                     <p:sldTgt/>
                   </p:tgtEl>
                 </p:cond>
               </p:prevCondLst>
               <p:nextCondLst>
-                <p:cond delay="0" evt="onNext">
+                <p:cond evt="onNext" delay="0">
                   <p:tgtEl>
                     <p:sldTgt/>
                   </p:tgtEl>
@@ -3883,7 +4645,7 @@
 </file>
 
 <file path=ppt/slides/slide6.xml><?xml version="1.0" encoding="utf-8"?>
-<p:sld xmlns:a="http://schemas.openxmlformats.org/drawingml/2006/main" xmlns:p="http://schemas.openxmlformats.org/presentationml/2006/main" xmlns:r="http://schemas.openxmlformats.org/officeDocument/2006/relationships">
+<p:sld xmlns:a="http://schemas.openxmlformats.org/drawingml/2006/main" xmlns:r="http://schemas.openxmlformats.org/officeDocument/2006/relationships" xmlns:p="http://schemas.openxmlformats.org/presentationml/2006/main">
   <p:cSld>
     <p:spTree>
       <p:nvGrpSpPr>
@@ -3941,12 +4703,12 @@
       </p:sp>
       <p:pic>
         <p:nvPicPr>
-          <p:cNvPr id="86" name="Picture 3" descr=""/>
+          <p:cNvPr id="86" name="Picture 3"/>
           <p:cNvPicPr/>
           <p:nvPr/>
         </p:nvPicPr>
         <p:blipFill>
-          <a:blip r:embed="rId1"/>
+          <a:blip r:embed="rId2"/>
           <a:stretch>
             <a:fillRect/>
           </a:stretch>
@@ -3966,22 +4728,25 @@
       </p:pic>
     </p:spTree>
   </p:cSld>
+  <p:clrMapOvr>
+    <a:masterClrMapping/>
+  </p:clrMapOvr>
   <p:timing>
     <p:tnLst>
       <p:par>
-        <p:cTn id="11" dur="indefinite" restart="never" nodeType="tmRoot">
+        <p:cTn id="1" dur="indefinite" restart="never" nodeType="tmRoot">
           <p:childTnLst>
             <p:seq>
-              <p:cTn id="12" nodeType="mainSeq"/>
+              <p:cTn id="2" nodeType="mainSeq"/>
               <p:prevCondLst>
-                <p:cond delay="0" evt="onPrev">
+                <p:cond evt="onPrev" delay="0">
                   <p:tgtEl>
                     <p:sldTgt/>
                   </p:tgtEl>
                 </p:cond>
               </p:prevCondLst>
               <p:nextCondLst>
-                <p:cond delay="0" evt="onNext">
+                <p:cond evt="onNext" delay="0">
                   <p:tgtEl>
                     <p:sldTgt/>
                   </p:tgtEl>
@@ -3997,7 +4762,7 @@
 </file>
 
 <file path=ppt/slides/slide7.xml><?xml version="1.0" encoding="utf-8"?>
-<p:sld xmlns:a="http://schemas.openxmlformats.org/drawingml/2006/main" xmlns:p="http://schemas.openxmlformats.org/presentationml/2006/main" xmlns:r="http://schemas.openxmlformats.org/officeDocument/2006/relationships">
+<p:sld xmlns:a="http://schemas.openxmlformats.org/drawingml/2006/main" xmlns:r="http://schemas.openxmlformats.org/officeDocument/2006/relationships" xmlns:p="http://schemas.openxmlformats.org/presentationml/2006/main">
   <p:cSld>
     <p:spTree>
       <p:nvGrpSpPr>
@@ -4033,7 +4798,8 @@
           </a:ln>
         </p:spPr>
         <p:txBody>
-          <a:bodyPr lIns="90000" rIns="90000" tIns="45000" bIns="45000" anchor="ctr"/>
+          <a:bodyPr lIns="90000" tIns="45000" rIns="90000" bIns="45000" anchor="ctr"/>
+          <a:lstStyle/>
           <a:p>
             <a:r>
               <a:rPr lang="en-US" sz="4400">
@@ -4047,12 +4813,12 @@
       </p:sp>
       <p:pic>
         <p:nvPicPr>
-          <p:cNvPr id="88" name="Content Placeholder 3" descr=""/>
+          <p:cNvPr id="88" name="Content Placeholder 3"/>
           <p:cNvPicPr/>
           <p:nvPr/>
         </p:nvPicPr>
         <p:blipFill>
-          <a:blip r:embed="rId1"/>
+          <a:blip r:embed="rId2"/>
           <a:stretch>
             <a:fillRect/>
           </a:stretch>
@@ -4072,22 +4838,25 @@
       </p:pic>
     </p:spTree>
   </p:cSld>
+  <p:clrMapOvr>
+    <a:masterClrMapping/>
+  </p:clrMapOvr>
   <p:timing>
     <p:tnLst>
       <p:par>
-        <p:cTn id="13" dur="indefinite" restart="never" nodeType="tmRoot">
+        <p:cTn id="1" dur="indefinite" restart="never" nodeType="tmRoot">
           <p:childTnLst>
             <p:seq>
-              <p:cTn id="14" nodeType="mainSeq"/>
+              <p:cTn id="2" nodeType="mainSeq"/>
               <p:prevCondLst>
-                <p:cond delay="0" evt="onPrev">
+                <p:cond evt="onPrev" delay="0">
                   <p:tgtEl>
                     <p:sldTgt/>
                   </p:tgtEl>
                 </p:cond>
               </p:prevCondLst>
               <p:nextCondLst>
-                <p:cond delay="0" evt="onNext">
+                <p:cond evt="onNext" delay="0">
                   <p:tgtEl>
                     <p:sldTgt/>
                   </p:tgtEl>
@@ -4103,7 +4872,7 @@
 </file>
 
 <file path=ppt/slides/slide8.xml><?xml version="1.0" encoding="utf-8"?>
-<p:sld xmlns:a="http://schemas.openxmlformats.org/drawingml/2006/main" xmlns:p="http://schemas.openxmlformats.org/presentationml/2006/main" xmlns:r="http://schemas.openxmlformats.org/officeDocument/2006/relationships">
+<p:sld xmlns:a="http://schemas.openxmlformats.org/drawingml/2006/main" xmlns:r="http://schemas.openxmlformats.org/officeDocument/2006/relationships" xmlns:p="http://schemas.openxmlformats.org/presentationml/2006/main">
   <p:cSld>
     <p:spTree>
       <p:nvGrpSpPr>
@@ -4139,7 +4908,8 @@
           </a:ln>
         </p:spPr>
         <p:txBody>
-          <a:bodyPr lIns="90000" rIns="90000" tIns="45000" bIns="45000" anchor="ctr"/>
+          <a:bodyPr lIns="90000" tIns="45000" rIns="90000" bIns="45000" anchor="ctr"/>
+          <a:lstStyle/>
           <a:p>
             <a:r>
               <a:rPr lang="en-US" sz="4400">
@@ -4153,12 +4923,12 @@
       </p:sp>
       <p:pic>
         <p:nvPicPr>
-          <p:cNvPr id="90" name="Content Placeholder 3" descr=""/>
+          <p:cNvPr id="90" name="Content Placeholder 3"/>
           <p:cNvPicPr/>
           <p:nvPr/>
         </p:nvPicPr>
         <p:blipFill>
-          <a:blip r:embed="rId1"/>
+          <a:blip r:embed="rId2"/>
           <a:stretch>
             <a:fillRect/>
           </a:stretch>
@@ -4178,22 +4948,25 @@
       </p:pic>
     </p:spTree>
   </p:cSld>
+  <p:clrMapOvr>
+    <a:masterClrMapping/>
+  </p:clrMapOvr>
   <p:timing>
     <p:tnLst>
       <p:par>
-        <p:cTn id="15" dur="indefinite" restart="never" nodeType="tmRoot">
+        <p:cTn id="1" dur="indefinite" restart="never" nodeType="tmRoot">
           <p:childTnLst>
             <p:seq>
-              <p:cTn id="16" nodeType="mainSeq"/>
+              <p:cTn id="2" nodeType="mainSeq"/>
               <p:prevCondLst>
-                <p:cond delay="0" evt="onPrev">
+                <p:cond evt="onPrev" delay="0">
                   <p:tgtEl>
                     <p:sldTgt/>
                   </p:tgtEl>
                 </p:cond>
               </p:prevCondLst>
               <p:nextCondLst>
-                <p:cond delay="0" evt="onNext">
+                <p:cond evt="onNext" delay="0">
                   <p:tgtEl>
                     <p:sldTgt/>
                   </p:tgtEl>
@@ -4209,7 +4982,7 @@
 </file>
 
 <file path=ppt/slides/slide9.xml><?xml version="1.0" encoding="utf-8"?>
-<p:sld xmlns:a="http://schemas.openxmlformats.org/drawingml/2006/main" xmlns:p="http://schemas.openxmlformats.org/presentationml/2006/main" xmlns:r="http://schemas.openxmlformats.org/officeDocument/2006/relationships">
+<p:sld xmlns:a="http://schemas.openxmlformats.org/drawingml/2006/main" xmlns:r="http://schemas.openxmlformats.org/officeDocument/2006/relationships" xmlns:p="http://schemas.openxmlformats.org/presentationml/2006/main">
   <p:cSld>
     <p:spTree>
       <p:nvGrpSpPr>
@@ -4245,7 +5018,8 @@
           </a:ln>
         </p:spPr>
         <p:txBody>
-          <a:bodyPr lIns="90000" rIns="90000" tIns="45000" bIns="45000" anchor="ctr"/>
+          <a:bodyPr lIns="90000" tIns="45000" rIns="90000" bIns="45000" anchor="ctr"/>
+          <a:lstStyle/>
           <a:p>
             <a:r>
               <a:rPr lang="en-US" sz="3600">
@@ -4259,12 +5033,12 @@
       </p:sp>
       <p:pic>
         <p:nvPicPr>
-          <p:cNvPr id="92" name="" descr=""/>
+          <p:cNvPr id="92" name="Afbeelding 91"/>
           <p:cNvPicPr/>
           <p:nvPr/>
         </p:nvPicPr>
         <p:blipFill>
-          <a:blip r:embed="rId1"/>
+          <a:blip r:embed="rId2"/>
           <a:stretch>
             <a:fillRect/>
           </a:stretch>
@@ -4284,22 +5058,25 @@
       </p:pic>
     </p:spTree>
   </p:cSld>
+  <p:clrMapOvr>
+    <a:masterClrMapping/>
+  </p:clrMapOvr>
   <p:timing>
     <p:tnLst>
       <p:par>
-        <p:cTn id="17" dur="indefinite" restart="never" nodeType="tmRoot">
+        <p:cTn id="1" dur="indefinite" restart="never" nodeType="tmRoot">
           <p:childTnLst>
             <p:seq>
-              <p:cTn id="18" nodeType="mainSeq"/>
+              <p:cTn id="2" nodeType="mainSeq"/>
               <p:prevCondLst>
-                <p:cond delay="0" evt="onPrev">
+                <p:cond evt="onPrev" delay="0">
                   <p:tgtEl>
                     <p:sldTgt/>
                   </p:tgtEl>
                 </p:cond>
               </p:prevCondLst>
               <p:nextCondLst>
-                <p:cond delay="0" evt="onNext">
+                <p:cond evt="onNext" delay="0">
                   <p:tgtEl>
                     <p:sldTgt/>
                   </p:tgtEl>
@@ -4534,6 +5311,8 @@
       </a:bgFillStyleLst>
     </a:fmtScheme>
   </a:themeElements>
+  <a:objectDefaults/>
+  <a:extraClrSchemeLst/>
 </a:theme>
 </file>
 
@@ -4757,5 +5536,7 @@
       </a:bgFillStyleLst>
     </a:fmtScheme>
   </a:themeElements>
+  <a:objectDefaults/>
+  <a:extraClrSchemeLst/>
 </a:theme>
 </file>
</xml_diff>